<commit_message>
Changed color of page 1
[git-p4: depot-paths = "//isd/dev/civil/c3d/users/huangt/": change = 277217]
</commit_message>
<xml_diff>
--- a/Bridge Design.pptx
+++ b/Bridge Design.pptx
@@ -200,7 +200,8 @@
           <a:p>
             <a:fld id="{5B28EAF2-68B5-4E8F-9C8F-15264EAB2573}" type="datetimeFigureOut">
               <a:rPr lang="en-US" smtClean="0"/>
-              <a:t>7/25/2011</a:t>
+              <a:pPr/>
+              <a:t>7/28/2011</a:t>
             </a:fld>
             <a:endParaRPr lang="en-US"/>
           </a:p>
@@ -359,6 +360,7 @@
           <a:p>
             <a:fld id="{599C040D-1D81-407F-845B-34621591C842}" type="slidenum">
               <a:rPr lang="en-US" smtClean="0"/>
+              <a:pPr/>
               <a:t>‹#›</a:t>
             </a:fld>
             <a:endParaRPr lang="en-US"/>
@@ -368,7 +370,7 @@
     </p:spTree>
     <p:extLst>
       <p:ext uri="{BB962C8B-B14F-4D97-AF65-F5344CB8AC3E}">
-        <p14:creationId xmlns:p14="http://schemas.microsoft.com/office/powerpoint/2010/main" val="4222944691"/>
+        <p14:creationId xmlns:p14="http://schemas.microsoft.com/office/powerpoint/2010/main" xmlns="" val="4222944691"/>
       </p:ext>
     </p:extLst>
   </p:cSld>
@@ -570,6 +572,7 @@
           <a:p>
             <a:fld id="{599C040D-1D81-407F-845B-34621591C842}" type="slidenum">
               <a:rPr lang="en-US" smtClean="0"/>
+              <a:pPr/>
               <a:t>1</a:t>
             </a:fld>
             <a:endParaRPr lang="en-US"/>
@@ -579,7 +582,7 @@
     </p:spTree>
     <p:extLst>
       <p:ext uri="{BB962C8B-B14F-4D97-AF65-F5344CB8AC3E}">
-        <p14:creationId xmlns:p14="http://schemas.microsoft.com/office/powerpoint/2010/main" val="3336225044"/>
+        <p14:creationId xmlns:p14="http://schemas.microsoft.com/office/powerpoint/2010/main" xmlns="" val="3336225044"/>
       </p:ext>
     </p:extLst>
   </p:cSld>
@@ -770,7 +773,8 @@
           <a:p>
             <a:fld id="{A7C056DB-5265-4679-920B-22289CCE72CA}" type="datetimeFigureOut">
               <a:rPr lang="zh-CN" altLang="en-US" smtClean="0"/>
-              <a:t>2011/7/25</a:t>
+              <a:pPr/>
+              <a:t>2011-7-28</a:t>
             </a:fld>
             <a:endParaRPr lang="zh-CN" altLang="en-US"/>
           </a:p>
@@ -812,6 +816,7 @@
           <a:p>
             <a:fld id="{E25DDA4C-A28A-4FF6-AD13-E84CA02B9DB0}" type="slidenum">
               <a:rPr lang="zh-CN" altLang="en-US" smtClean="0"/>
+              <a:pPr/>
               <a:t>‹#›</a:t>
             </a:fld>
             <a:endParaRPr lang="zh-CN" altLang="en-US"/>
@@ -821,18 +826,18 @@
     </p:spTree>
     <p:extLst>
       <p:ext uri="{BB962C8B-B14F-4D97-AF65-F5344CB8AC3E}">
-        <p14:creationId xmlns:p14="http://schemas.microsoft.com/office/powerpoint/2010/main" val="3473094441"/>
+        <p14:creationId xmlns:p14="http://schemas.microsoft.com/office/powerpoint/2010/main" xmlns="" val="3473094441"/>
       </p:ext>
     </p:extLst>
   </p:cSld>
   <p:clrMapOvr>
     <a:masterClrMapping/>
   </p:clrMapOvr>
-  <mc:AlternateContent xmlns:mc="http://schemas.openxmlformats.org/markup-compatibility/2006" xmlns:p14="http://schemas.microsoft.com/office/powerpoint/2010/main">
-    <mc:Choice Requires="p14">
+  <mc:AlternateContent xmlns:mc="http://schemas.openxmlformats.org/markup-compatibility/2006">
+    <mc:Choice xmlns:p14="http://schemas.microsoft.com/office/powerpoint/2010/main" xmlns="" Requires="p14">
       <p:transition p14:dur="0"/>
     </mc:Choice>
-    <mc:Fallback xmlns="">
+    <mc:Fallback>
       <p:transition/>
     </mc:Fallback>
   </mc:AlternateContent>
@@ -948,7 +953,8 @@
           <a:p>
             <a:fld id="{A7C056DB-5265-4679-920B-22289CCE72CA}" type="datetimeFigureOut">
               <a:rPr lang="zh-CN" altLang="en-US" smtClean="0"/>
-              <a:t>2011/7/25</a:t>
+              <a:pPr/>
+              <a:t>2011-7-28</a:t>
             </a:fld>
             <a:endParaRPr lang="zh-CN" altLang="en-US"/>
           </a:p>
@@ -990,6 +996,7 @@
           <a:p>
             <a:fld id="{E25DDA4C-A28A-4FF6-AD13-E84CA02B9DB0}" type="slidenum">
               <a:rPr lang="zh-CN" altLang="en-US" smtClean="0"/>
+              <a:pPr/>
               <a:t>‹#›</a:t>
             </a:fld>
             <a:endParaRPr lang="zh-CN" altLang="en-US"/>
@@ -999,18 +1006,18 @@
     </p:spTree>
     <p:extLst>
       <p:ext uri="{BB962C8B-B14F-4D97-AF65-F5344CB8AC3E}">
-        <p14:creationId xmlns:p14="http://schemas.microsoft.com/office/powerpoint/2010/main" val="602533551"/>
+        <p14:creationId xmlns:p14="http://schemas.microsoft.com/office/powerpoint/2010/main" xmlns="" val="602533551"/>
       </p:ext>
     </p:extLst>
   </p:cSld>
   <p:clrMapOvr>
     <a:masterClrMapping/>
   </p:clrMapOvr>
-  <mc:AlternateContent xmlns:mc="http://schemas.openxmlformats.org/markup-compatibility/2006" xmlns:p14="http://schemas.microsoft.com/office/powerpoint/2010/main">
-    <mc:Choice Requires="p14">
+  <mc:AlternateContent xmlns:mc="http://schemas.openxmlformats.org/markup-compatibility/2006">
+    <mc:Choice xmlns:p14="http://schemas.microsoft.com/office/powerpoint/2010/main" xmlns="" Requires="p14">
       <p:transition p14:dur="0"/>
     </mc:Choice>
-    <mc:Fallback xmlns="">
+    <mc:Fallback>
       <p:transition/>
     </mc:Fallback>
   </mc:AlternateContent>
@@ -1136,7 +1143,8 @@
           <a:p>
             <a:fld id="{A7C056DB-5265-4679-920B-22289CCE72CA}" type="datetimeFigureOut">
               <a:rPr lang="zh-CN" altLang="en-US" smtClean="0"/>
-              <a:t>2011/7/25</a:t>
+              <a:pPr/>
+              <a:t>2011-7-28</a:t>
             </a:fld>
             <a:endParaRPr lang="zh-CN" altLang="en-US"/>
           </a:p>
@@ -1178,6 +1186,7 @@
           <a:p>
             <a:fld id="{E25DDA4C-A28A-4FF6-AD13-E84CA02B9DB0}" type="slidenum">
               <a:rPr lang="zh-CN" altLang="en-US" smtClean="0"/>
+              <a:pPr/>
               <a:t>‹#›</a:t>
             </a:fld>
             <a:endParaRPr lang="zh-CN" altLang="en-US"/>
@@ -1187,18 +1196,18 @@
     </p:spTree>
     <p:extLst>
       <p:ext uri="{BB962C8B-B14F-4D97-AF65-F5344CB8AC3E}">
-        <p14:creationId xmlns:p14="http://schemas.microsoft.com/office/powerpoint/2010/main" val="1415166830"/>
+        <p14:creationId xmlns:p14="http://schemas.microsoft.com/office/powerpoint/2010/main" xmlns="" val="1415166830"/>
       </p:ext>
     </p:extLst>
   </p:cSld>
   <p:clrMapOvr>
     <a:masterClrMapping/>
   </p:clrMapOvr>
-  <mc:AlternateContent xmlns:mc="http://schemas.openxmlformats.org/markup-compatibility/2006" xmlns:p14="http://schemas.microsoft.com/office/powerpoint/2010/main">
-    <mc:Choice Requires="p14">
+  <mc:AlternateContent xmlns:mc="http://schemas.openxmlformats.org/markup-compatibility/2006">
+    <mc:Choice xmlns:p14="http://schemas.microsoft.com/office/powerpoint/2010/main" xmlns="" Requires="p14">
       <p:transition p14:dur="0"/>
     </mc:Choice>
-    <mc:Fallback xmlns="">
+    <mc:Fallback>
       <p:transition/>
     </mc:Fallback>
   </mc:AlternateContent>
@@ -1314,7 +1323,8 @@
           <a:p>
             <a:fld id="{A7C056DB-5265-4679-920B-22289CCE72CA}" type="datetimeFigureOut">
               <a:rPr lang="zh-CN" altLang="en-US" smtClean="0"/>
-              <a:t>2011/7/25</a:t>
+              <a:pPr/>
+              <a:t>2011-7-28</a:t>
             </a:fld>
             <a:endParaRPr lang="zh-CN" altLang="en-US"/>
           </a:p>
@@ -1356,6 +1366,7 @@
           <a:p>
             <a:fld id="{E25DDA4C-A28A-4FF6-AD13-E84CA02B9DB0}" type="slidenum">
               <a:rPr lang="zh-CN" altLang="en-US" smtClean="0"/>
+              <a:pPr/>
               <a:t>‹#›</a:t>
             </a:fld>
             <a:endParaRPr lang="zh-CN" altLang="en-US"/>
@@ -1365,18 +1376,18 @@
     </p:spTree>
     <p:extLst>
       <p:ext uri="{BB962C8B-B14F-4D97-AF65-F5344CB8AC3E}">
-        <p14:creationId xmlns:p14="http://schemas.microsoft.com/office/powerpoint/2010/main" val="913174924"/>
+        <p14:creationId xmlns:p14="http://schemas.microsoft.com/office/powerpoint/2010/main" xmlns="" val="913174924"/>
       </p:ext>
     </p:extLst>
   </p:cSld>
   <p:clrMapOvr>
     <a:masterClrMapping/>
   </p:clrMapOvr>
-  <mc:AlternateContent xmlns:mc="http://schemas.openxmlformats.org/markup-compatibility/2006" xmlns:p14="http://schemas.microsoft.com/office/powerpoint/2010/main">
-    <mc:Choice Requires="p14">
+  <mc:AlternateContent xmlns:mc="http://schemas.openxmlformats.org/markup-compatibility/2006">
+    <mc:Choice xmlns:p14="http://schemas.microsoft.com/office/powerpoint/2010/main" xmlns="" Requires="p14">
       <p:transition p14:dur="0"/>
     </mc:Choice>
-    <mc:Fallback xmlns="">
+    <mc:Fallback>
       <p:transition/>
     </mc:Fallback>
   </mc:AlternateContent>
@@ -1568,7 +1579,8 @@
           <a:p>
             <a:fld id="{A7C056DB-5265-4679-920B-22289CCE72CA}" type="datetimeFigureOut">
               <a:rPr lang="zh-CN" altLang="en-US" smtClean="0"/>
-              <a:t>2011/7/25</a:t>
+              <a:pPr/>
+              <a:t>2011-7-28</a:t>
             </a:fld>
             <a:endParaRPr lang="zh-CN" altLang="en-US"/>
           </a:p>
@@ -1610,6 +1622,7 @@
           <a:p>
             <a:fld id="{E25DDA4C-A28A-4FF6-AD13-E84CA02B9DB0}" type="slidenum">
               <a:rPr lang="zh-CN" altLang="en-US" smtClean="0"/>
+              <a:pPr/>
               <a:t>‹#›</a:t>
             </a:fld>
             <a:endParaRPr lang="zh-CN" altLang="en-US"/>
@@ -1619,18 +1632,18 @@
     </p:spTree>
     <p:extLst>
       <p:ext uri="{BB962C8B-B14F-4D97-AF65-F5344CB8AC3E}">
-        <p14:creationId xmlns:p14="http://schemas.microsoft.com/office/powerpoint/2010/main" val="2712454501"/>
+        <p14:creationId xmlns:p14="http://schemas.microsoft.com/office/powerpoint/2010/main" xmlns="" val="2712454501"/>
       </p:ext>
     </p:extLst>
   </p:cSld>
   <p:clrMapOvr>
     <a:masterClrMapping/>
   </p:clrMapOvr>
-  <mc:AlternateContent xmlns:mc="http://schemas.openxmlformats.org/markup-compatibility/2006" xmlns:p14="http://schemas.microsoft.com/office/powerpoint/2010/main">
-    <mc:Choice Requires="p14">
+  <mc:AlternateContent xmlns:mc="http://schemas.openxmlformats.org/markup-compatibility/2006">
+    <mc:Choice xmlns:p14="http://schemas.microsoft.com/office/powerpoint/2010/main" xmlns="" Requires="p14">
       <p:transition p14:dur="0"/>
     </mc:Choice>
-    <mc:Fallback xmlns="">
+    <mc:Fallback>
       <p:transition/>
     </mc:Fallback>
   </mc:AlternateContent>
@@ -1864,7 +1877,8 @@
           <a:p>
             <a:fld id="{A7C056DB-5265-4679-920B-22289CCE72CA}" type="datetimeFigureOut">
               <a:rPr lang="zh-CN" altLang="en-US" smtClean="0"/>
-              <a:t>2011/7/25</a:t>
+              <a:pPr/>
+              <a:t>2011-7-28</a:t>
             </a:fld>
             <a:endParaRPr lang="zh-CN" altLang="en-US"/>
           </a:p>
@@ -1906,6 +1920,7 @@
           <a:p>
             <a:fld id="{E25DDA4C-A28A-4FF6-AD13-E84CA02B9DB0}" type="slidenum">
               <a:rPr lang="zh-CN" altLang="en-US" smtClean="0"/>
+              <a:pPr/>
               <a:t>‹#›</a:t>
             </a:fld>
             <a:endParaRPr lang="zh-CN" altLang="en-US"/>
@@ -1915,18 +1930,18 @@
     </p:spTree>
     <p:extLst>
       <p:ext uri="{BB962C8B-B14F-4D97-AF65-F5344CB8AC3E}">
-        <p14:creationId xmlns:p14="http://schemas.microsoft.com/office/powerpoint/2010/main" val="413473357"/>
+        <p14:creationId xmlns:p14="http://schemas.microsoft.com/office/powerpoint/2010/main" xmlns="" val="413473357"/>
       </p:ext>
     </p:extLst>
   </p:cSld>
   <p:clrMapOvr>
     <a:masterClrMapping/>
   </p:clrMapOvr>
-  <mc:AlternateContent xmlns:mc="http://schemas.openxmlformats.org/markup-compatibility/2006" xmlns:p14="http://schemas.microsoft.com/office/powerpoint/2010/main">
-    <mc:Choice Requires="p14">
+  <mc:AlternateContent xmlns:mc="http://schemas.openxmlformats.org/markup-compatibility/2006">
+    <mc:Choice xmlns:p14="http://schemas.microsoft.com/office/powerpoint/2010/main" xmlns="" Requires="p14">
       <p:transition p14:dur="0"/>
     </mc:Choice>
-    <mc:Fallback xmlns="">
+    <mc:Fallback>
       <p:transition/>
     </mc:Fallback>
   </mc:AlternateContent>
@@ -2294,7 +2309,8 @@
           <a:p>
             <a:fld id="{A7C056DB-5265-4679-920B-22289CCE72CA}" type="datetimeFigureOut">
               <a:rPr lang="zh-CN" altLang="en-US" smtClean="0"/>
-              <a:t>2011/7/25</a:t>
+              <a:pPr/>
+              <a:t>2011-7-28</a:t>
             </a:fld>
             <a:endParaRPr lang="zh-CN" altLang="en-US"/>
           </a:p>
@@ -2336,6 +2352,7 @@
           <a:p>
             <a:fld id="{E25DDA4C-A28A-4FF6-AD13-E84CA02B9DB0}" type="slidenum">
               <a:rPr lang="zh-CN" altLang="en-US" smtClean="0"/>
+              <a:pPr/>
               <a:t>‹#›</a:t>
             </a:fld>
             <a:endParaRPr lang="zh-CN" altLang="en-US"/>
@@ -2345,18 +2362,18 @@
     </p:spTree>
     <p:extLst>
       <p:ext uri="{BB962C8B-B14F-4D97-AF65-F5344CB8AC3E}">
-        <p14:creationId xmlns:p14="http://schemas.microsoft.com/office/powerpoint/2010/main" val="1146976206"/>
+        <p14:creationId xmlns:p14="http://schemas.microsoft.com/office/powerpoint/2010/main" xmlns="" val="1146976206"/>
       </p:ext>
     </p:extLst>
   </p:cSld>
   <p:clrMapOvr>
     <a:masterClrMapping/>
   </p:clrMapOvr>
-  <mc:AlternateContent xmlns:mc="http://schemas.openxmlformats.org/markup-compatibility/2006" xmlns:p14="http://schemas.microsoft.com/office/powerpoint/2010/main">
-    <mc:Choice Requires="p14">
+  <mc:AlternateContent xmlns:mc="http://schemas.openxmlformats.org/markup-compatibility/2006">
+    <mc:Choice xmlns:p14="http://schemas.microsoft.com/office/powerpoint/2010/main" xmlns="" Requires="p14">
       <p:transition p14:dur="0"/>
     </mc:Choice>
-    <mc:Fallback xmlns="">
+    <mc:Fallback>
       <p:transition/>
     </mc:Fallback>
   </mc:AlternateContent>
@@ -2420,7 +2437,8 @@
           <a:p>
             <a:fld id="{A7C056DB-5265-4679-920B-22289CCE72CA}" type="datetimeFigureOut">
               <a:rPr lang="zh-CN" altLang="en-US" smtClean="0"/>
-              <a:t>2011/7/25</a:t>
+              <a:pPr/>
+              <a:t>2011-7-28</a:t>
             </a:fld>
             <a:endParaRPr lang="zh-CN" altLang="en-US"/>
           </a:p>
@@ -2462,6 +2480,7 @@
           <a:p>
             <a:fld id="{E25DDA4C-A28A-4FF6-AD13-E84CA02B9DB0}" type="slidenum">
               <a:rPr lang="zh-CN" altLang="en-US" smtClean="0"/>
+              <a:pPr/>
               <a:t>‹#›</a:t>
             </a:fld>
             <a:endParaRPr lang="zh-CN" altLang="en-US"/>
@@ -2471,18 +2490,18 @@
     </p:spTree>
     <p:extLst>
       <p:ext uri="{BB962C8B-B14F-4D97-AF65-F5344CB8AC3E}">
-        <p14:creationId xmlns:p14="http://schemas.microsoft.com/office/powerpoint/2010/main" val="2183323527"/>
+        <p14:creationId xmlns:p14="http://schemas.microsoft.com/office/powerpoint/2010/main" xmlns="" val="2183323527"/>
       </p:ext>
     </p:extLst>
   </p:cSld>
   <p:clrMapOvr>
     <a:masterClrMapping/>
   </p:clrMapOvr>
-  <mc:AlternateContent xmlns:mc="http://schemas.openxmlformats.org/markup-compatibility/2006" xmlns:p14="http://schemas.microsoft.com/office/powerpoint/2010/main">
-    <mc:Choice Requires="p14">
+  <mc:AlternateContent xmlns:mc="http://schemas.openxmlformats.org/markup-compatibility/2006">
+    <mc:Choice xmlns:p14="http://schemas.microsoft.com/office/powerpoint/2010/main" xmlns="" Requires="p14">
       <p:transition p14:dur="0"/>
     </mc:Choice>
-    <mc:Fallback xmlns="">
+    <mc:Fallback>
       <p:transition/>
     </mc:Fallback>
   </mc:AlternateContent>
@@ -2523,7 +2542,8 @@
           <a:p>
             <a:fld id="{A7C056DB-5265-4679-920B-22289CCE72CA}" type="datetimeFigureOut">
               <a:rPr lang="zh-CN" altLang="en-US" smtClean="0"/>
-              <a:t>2011/7/25</a:t>
+              <a:pPr/>
+              <a:t>2011-7-28</a:t>
             </a:fld>
             <a:endParaRPr lang="zh-CN" altLang="en-US"/>
           </a:p>
@@ -2565,6 +2585,7 @@
           <a:p>
             <a:fld id="{E25DDA4C-A28A-4FF6-AD13-E84CA02B9DB0}" type="slidenum">
               <a:rPr lang="zh-CN" altLang="en-US" smtClean="0"/>
+              <a:pPr/>
               <a:t>‹#›</a:t>
             </a:fld>
             <a:endParaRPr lang="zh-CN" altLang="en-US"/>
@@ -2574,18 +2595,18 @@
     </p:spTree>
     <p:extLst>
       <p:ext uri="{BB962C8B-B14F-4D97-AF65-F5344CB8AC3E}">
-        <p14:creationId xmlns:p14="http://schemas.microsoft.com/office/powerpoint/2010/main" val="201629998"/>
+        <p14:creationId xmlns:p14="http://schemas.microsoft.com/office/powerpoint/2010/main" xmlns="" val="201629998"/>
       </p:ext>
     </p:extLst>
   </p:cSld>
   <p:clrMapOvr>
     <a:masterClrMapping/>
   </p:clrMapOvr>
-  <mc:AlternateContent xmlns:mc="http://schemas.openxmlformats.org/markup-compatibility/2006" xmlns:p14="http://schemas.microsoft.com/office/powerpoint/2010/main">
-    <mc:Choice Requires="p14">
+  <mc:AlternateContent xmlns:mc="http://schemas.openxmlformats.org/markup-compatibility/2006">
+    <mc:Choice xmlns:p14="http://schemas.microsoft.com/office/powerpoint/2010/main" xmlns="" Requires="p14">
       <p:transition p14:dur="0"/>
     </mc:Choice>
-    <mc:Fallback xmlns="">
+    <mc:Fallback>
       <p:transition/>
     </mc:Fallback>
   </mc:AlternateContent>
@@ -2808,7 +2829,8 @@
           <a:p>
             <a:fld id="{A7C056DB-5265-4679-920B-22289CCE72CA}" type="datetimeFigureOut">
               <a:rPr lang="zh-CN" altLang="en-US" smtClean="0"/>
-              <a:t>2011/7/25</a:t>
+              <a:pPr/>
+              <a:t>2011-7-28</a:t>
             </a:fld>
             <a:endParaRPr lang="zh-CN" altLang="en-US"/>
           </a:p>
@@ -2850,6 +2872,7 @@
           <a:p>
             <a:fld id="{E25DDA4C-A28A-4FF6-AD13-E84CA02B9DB0}" type="slidenum">
               <a:rPr lang="zh-CN" altLang="en-US" smtClean="0"/>
+              <a:pPr/>
               <a:t>‹#›</a:t>
             </a:fld>
             <a:endParaRPr lang="zh-CN" altLang="en-US"/>
@@ -2859,18 +2882,18 @@
     </p:spTree>
     <p:extLst>
       <p:ext uri="{BB962C8B-B14F-4D97-AF65-F5344CB8AC3E}">
-        <p14:creationId xmlns:p14="http://schemas.microsoft.com/office/powerpoint/2010/main" val="3006800205"/>
+        <p14:creationId xmlns:p14="http://schemas.microsoft.com/office/powerpoint/2010/main" xmlns="" val="3006800205"/>
       </p:ext>
     </p:extLst>
   </p:cSld>
   <p:clrMapOvr>
     <a:masterClrMapping/>
   </p:clrMapOvr>
-  <mc:AlternateContent xmlns:mc="http://schemas.openxmlformats.org/markup-compatibility/2006" xmlns:p14="http://schemas.microsoft.com/office/powerpoint/2010/main">
-    <mc:Choice Requires="p14">
+  <mc:AlternateContent xmlns:mc="http://schemas.openxmlformats.org/markup-compatibility/2006">
+    <mc:Choice xmlns:p14="http://schemas.microsoft.com/office/powerpoint/2010/main" xmlns="" Requires="p14">
       <p:transition p14:dur="0"/>
     </mc:Choice>
-    <mc:Fallback xmlns="">
+    <mc:Fallback>
       <p:transition/>
     </mc:Fallback>
   </mc:AlternateContent>
@@ -3069,7 +3092,8 @@
           <a:p>
             <a:fld id="{A7C056DB-5265-4679-920B-22289CCE72CA}" type="datetimeFigureOut">
               <a:rPr lang="zh-CN" altLang="en-US" smtClean="0"/>
-              <a:t>2011/7/25</a:t>
+              <a:pPr/>
+              <a:t>2011-7-28</a:t>
             </a:fld>
             <a:endParaRPr lang="zh-CN" altLang="en-US"/>
           </a:p>
@@ -3111,6 +3135,7 @@
           <a:p>
             <a:fld id="{E25DDA4C-A28A-4FF6-AD13-E84CA02B9DB0}" type="slidenum">
               <a:rPr lang="zh-CN" altLang="en-US" smtClean="0"/>
+              <a:pPr/>
               <a:t>‹#›</a:t>
             </a:fld>
             <a:endParaRPr lang="zh-CN" altLang="en-US"/>
@@ -3120,18 +3145,18 @@
     </p:spTree>
     <p:extLst>
       <p:ext uri="{BB962C8B-B14F-4D97-AF65-F5344CB8AC3E}">
-        <p14:creationId xmlns:p14="http://schemas.microsoft.com/office/powerpoint/2010/main" val="446376401"/>
+        <p14:creationId xmlns:p14="http://schemas.microsoft.com/office/powerpoint/2010/main" xmlns="" val="446376401"/>
       </p:ext>
     </p:extLst>
   </p:cSld>
   <p:clrMapOvr>
     <a:masterClrMapping/>
   </p:clrMapOvr>
-  <mc:AlternateContent xmlns:mc="http://schemas.openxmlformats.org/markup-compatibility/2006" xmlns:p14="http://schemas.microsoft.com/office/powerpoint/2010/main">
-    <mc:Choice Requires="p14">
+  <mc:AlternateContent xmlns:mc="http://schemas.openxmlformats.org/markup-compatibility/2006">
+    <mc:Choice xmlns:p14="http://schemas.microsoft.com/office/powerpoint/2010/main" xmlns="" Requires="p14">
       <p:transition p14:dur="0"/>
     </mc:Choice>
-    <mc:Fallback xmlns="">
+    <mc:Fallback>
       <p:transition/>
     </mc:Fallback>
   </mc:AlternateContent>
@@ -3293,7 +3318,8 @@
           <a:p>
             <a:fld id="{A7C056DB-5265-4679-920B-22289CCE72CA}" type="datetimeFigureOut">
               <a:rPr lang="zh-CN" altLang="en-US" smtClean="0"/>
-              <a:t>2011/7/25</a:t>
+              <a:pPr/>
+              <a:t>2011-7-28</a:t>
             </a:fld>
             <a:endParaRPr lang="zh-CN" altLang="en-US"/>
           </a:p>
@@ -3371,6 +3397,7 @@
           <a:p>
             <a:fld id="{E25DDA4C-A28A-4FF6-AD13-E84CA02B9DB0}" type="slidenum">
               <a:rPr lang="zh-CN" altLang="en-US" smtClean="0"/>
+              <a:pPr/>
               <a:t>‹#›</a:t>
             </a:fld>
             <a:endParaRPr lang="zh-CN" altLang="en-US"/>
@@ -3380,7 +3407,7 @@
     </p:spTree>
     <p:extLst>
       <p:ext uri="{BB962C8B-B14F-4D97-AF65-F5344CB8AC3E}">
-        <p14:creationId xmlns:p14="http://schemas.microsoft.com/office/powerpoint/2010/main" val="3454376716"/>
+        <p14:creationId xmlns:p14="http://schemas.microsoft.com/office/powerpoint/2010/main" xmlns="" val="3454376716"/>
       </p:ext>
     </p:extLst>
   </p:cSld>
@@ -3398,11 +3425,11 @@
     <p:sldLayoutId id="2147483658" r:id="rId10"/>
     <p:sldLayoutId id="2147483659" r:id="rId11"/>
   </p:sldLayoutIdLst>
-  <mc:AlternateContent xmlns:mc="http://schemas.openxmlformats.org/markup-compatibility/2006" xmlns:p14="http://schemas.microsoft.com/office/powerpoint/2010/main">
-    <mc:Choice Requires="p14">
+  <mc:AlternateContent xmlns:mc="http://schemas.openxmlformats.org/markup-compatibility/2006">
+    <mc:Choice xmlns:p14="http://schemas.microsoft.com/office/powerpoint/2010/main" xmlns="" Requires="p14">
       <p:transition p14:dur="0"/>
     </mc:Choice>
-    <mc:Fallback xmlns="">
+    <mc:Fallback>
       <p:transition/>
     </mc:Fallback>
   </mc:AlternateContent>
@@ -3690,6 +3717,12 @@
           <a:prstGeom prst="roundRect">
             <a:avLst/>
           </a:prstGeom>
+          <a:solidFill>
+            <a:schemeClr val="accent4">
+              <a:lumMod val="60000"/>
+              <a:lumOff val="40000"/>
+            </a:schemeClr>
+          </a:solidFill>
         </p:spPr>
         <p:style>
           <a:lnRef idx="2">
@@ -3719,6 +3752,11 @@
               </a:rPr>
               <a:t>Civil3D</a:t>
             </a:r>
+            <a:endParaRPr lang="en-US" altLang="zh-CN" sz="3200" b="1" dirty="0" smtClean="0">
+              <a:solidFill>
+                <a:srgbClr val="FF0000"/>
+              </a:solidFill>
+            </a:endParaRPr>
           </a:p>
           <a:p>
             <a:r>
@@ -3823,6 +3861,12 @@
           <a:prstGeom prst="roundRect">
             <a:avLst/>
           </a:prstGeom>
+          <a:solidFill>
+            <a:schemeClr val="tx2">
+              <a:lumMod val="20000"/>
+              <a:lumOff val="80000"/>
+            </a:schemeClr>
+          </a:solidFill>
         </p:spPr>
         <p:style>
           <a:lnRef idx="2">
@@ -3875,6 +3919,12 @@
           <a:prstGeom prst="roundRect">
             <a:avLst/>
           </a:prstGeom>
+          <a:solidFill>
+            <a:schemeClr val="tx2">
+              <a:lumMod val="20000"/>
+              <a:lumOff val="80000"/>
+            </a:schemeClr>
+          </a:solidFill>
         </p:spPr>
         <p:style>
           <a:lnRef idx="2">
@@ -3925,8 +3975,16 @@
             <a:ext cx="1440160" cy="1692188"/>
           </a:xfrm>
           <a:prstGeom prst="roundRect">
-            <a:avLst/>
-          </a:prstGeom>
+            <a:avLst>
+              <a:gd name="adj" fmla="val 6243"/>
+            </a:avLst>
+          </a:prstGeom>
+          <a:solidFill>
+            <a:schemeClr val="tx2">
+              <a:lumMod val="20000"/>
+              <a:lumOff val="80000"/>
+            </a:schemeClr>
+          </a:solidFill>
         </p:spPr>
         <p:style>
           <a:lnRef idx="2">
@@ -4008,7 +4066,7 @@
         </p:nvSpPr>
         <p:spPr>
           <a:xfrm>
-            <a:off x="2699792" y="1952836"/>
+            <a:off x="2699792" y="2024844"/>
             <a:ext cx="1440160" cy="612068"/>
           </a:xfrm>
           <a:prstGeom prst="roundRect">
@@ -4074,14 +4132,17 @@
         </p:nvSpPr>
         <p:spPr>
           <a:xfrm>
-            <a:off x="2699792" y="2600908"/>
+            <a:off x="2699792" y="2672916"/>
             <a:ext cx="1440160" cy="612068"/>
           </a:xfrm>
           <a:prstGeom prst="roundRect">
             <a:avLst/>
           </a:prstGeom>
           <a:solidFill>
-            <a:schemeClr val="accent1"/>
+            <a:schemeClr val="tx2">
+              <a:lumMod val="20000"/>
+              <a:lumOff val="80000"/>
+            </a:schemeClr>
           </a:solidFill>
         </p:spPr>
         <p:style>
@@ -4146,6 +4207,12 @@
           <a:prstGeom prst="roundRect">
             <a:avLst/>
           </a:prstGeom>
+          <a:solidFill>
+            <a:schemeClr val="tx2">
+              <a:lumMod val="20000"/>
+              <a:lumOff val="80000"/>
+            </a:schemeClr>
+          </a:solidFill>
         </p:spPr>
         <p:style>
           <a:lnRef idx="2">
@@ -4203,7 +4270,10 @@
             <a:avLst/>
           </a:prstGeom>
           <a:solidFill>
-            <a:schemeClr val="accent1"/>
+            <a:schemeClr val="tx2">
+              <a:lumMod val="20000"/>
+              <a:lumOff val="80000"/>
+            </a:schemeClr>
           </a:solidFill>
         </p:spPr>
         <p:style>
@@ -4257,6 +4327,12 @@
           <a:prstGeom prst="roundRect">
             <a:avLst/>
           </a:prstGeom>
+          <a:solidFill>
+            <a:schemeClr val="accent4">
+              <a:lumMod val="60000"/>
+              <a:lumOff val="40000"/>
+            </a:schemeClr>
+          </a:solidFill>
         </p:spPr>
         <p:style>
           <a:lnRef idx="2">
@@ -4325,11 +4401,6 @@
               </a:rPr>
               <a:t>(RST)</a:t>
             </a:r>
-            <a:endParaRPr lang="en-US" altLang="zh-CN" sz="2400" b="1" dirty="0" smtClean="0">
-              <a:solidFill>
-                <a:srgbClr val="C00000"/>
-              </a:solidFill>
-            </a:endParaRPr>
           </a:p>
           <a:p>
             <a:pPr algn="r"/>
@@ -4925,7 +4996,7 @@
         </p:nvSpPr>
         <p:spPr>
           <a:xfrm>
-            <a:off x="5364088" y="332656"/>
+            <a:off x="5220072" y="332656"/>
             <a:ext cx="3096344" cy="1440160"/>
           </a:xfrm>
           <a:prstGeom prst="rect">
@@ -4962,29 +5033,53 @@
           <a:p>
             <a:pPr algn="ctr"/>
             <a:r>
-              <a:rPr lang="en-US" altLang="zh-CN" dirty="0"/>
+              <a:rPr lang="en-US" altLang="zh-CN" dirty="0">
+                <a:solidFill>
+                  <a:schemeClr val="tx1"/>
+                </a:solidFill>
+              </a:rPr>
               <a:t>Design </a:t>
             </a:r>
             <a:r>
-              <a:rPr lang="en-US" altLang="zh-CN" dirty="0" smtClean="0"/>
+              <a:rPr lang="en-US" altLang="zh-CN" dirty="0" smtClean="0">
+                <a:solidFill>
+                  <a:schemeClr val="tx1"/>
+                </a:solidFill>
+              </a:rPr>
               <a:t>conditions</a:t>
             </a:r>
           </a:p>
           <a:p>
             <a:pPr algn="ctr"/>
-            <a:endParaRPr lang="en-US" altLang="zh-CN" dirty="0"/>
+            <a:endParaRPr lang="en-US" altLang="zh-CN" dirty="0">
+              <a:solidFill>
+                <a:schemeClr val="tx1"/>
+              </a:solidFill>
+            </a:endParaRPr>
           </a:p>
           <a:p>
             <a:pPr algn="ctr"/>
-            <a:endParaRPr lang="en-US" altLang="zh-CN" dirty="0" smtClean="0"/>
+            <a:endParaRPr lang="en-US" altLang="zh-CN" dirty="0" smtClean="0">
+              <a:solidFill>
+                <a:schemeClr val="tx1"/>
+              </a:solidFill>
+            </a:endParaRPr>
           </a:p>
           <a:p>
             <a:pPr algn="ctr"/>
-            <a:endParaRPr lang="en-US" altLang="zh-CN" dirty="0"/>
+            <a:endParaRPr lang="en-US" altLang="zh-CN" dirty="0">
+              <a:solidFill>
+                <a:schemeClr val="tx1"/>
+              </a:solidFill>
+            </a:endParaRPr>
           </a:p>
           <a:p>
             <a:pPr algn="ctr"/>
-            <a:endParaRPr lang="en-US" altLang="zh-CN" dirty="0" smtClean="0"/>
+            <a:endParaRPr lang="en-US" altLang="zh-CN" dirty="0" smtClean="0">
+              <a:solidFill>
+                <a:schemeClr val="tx1"/>
+              </a:solidFill>
+            </a:endParaRPr>
           </a:p>
         </p:txBody>
       </p:sp>
@@ -4996,7 +5091,7 @@
         </p:nvSpPr>
         <p:spPr>
           <a:xfrm>
-            <a:off x="5508104" y="764704"/>
+            <a:off x="5292080" y="764704"/>
             <a:ext cx="1368152" cy="360040"/>
           </a:xfrm>
           <a:prstGeom prst="rect">
@@ -5043,7 +5138,7 @@
         </p:nvSpPr>
         <p:spPr>
           <a:xfrm>
-            <a:off x="7020272" y="764704"/>
+            <a:off x="6804248" y="764704"/>
             <a:ext cx="1368152" cy="360040"/>
           </a:xfrm>
           <a:prstGeom prst="rect">
@@ -5090,7 +5185,7 @@
         </p:nvSpPr>
         <p:spPr>
           <a:xfrm>
-            <a:off x="5508104" y="1268760"/>
+            <a:off x="5292080" y="1268760"/>
             <a:ext cx="1368152" cy="360040"/>
           </a:xfrm>
           <a:prstGeom prst="rect">
@@ -5137,7 +5232,7 @@
         </p:nvSpPr>
         <p:spPr>
           <a:xfrm>
-            <a:off x="7020272" y="1268760"/>
+            <a:off x="6804248" y="1268760"/>
             <a:ext cx="1368152" cy="360040"/>
           </a:xfrm>
           <a:prstGeom prst="rect">
@@ -5184,7 +5279,7 @@
         </p:nvSpPr>
         <p:spPr>
           <a:xfrm>
-            <a:off x="5352637" y="1916832"/>
+            <a:off x="5220072" y="1916832"/>
             <a:ext cx="1811651" cy="1872208"/>
           </a:xfrm>
           <a:prstGeom prst="rect">
@@ -5221,7 +5316,11 @@
           <a:p>
             <a:pPr algn="ctr"/>
             <a:r>
-              <a:rPr lang="en-US" altLang="zh-CN" dirty="0"/>
+              <a:rPr lang="en-US" altLang="zh-CN" dirty="0">
+                <a:solidFill>
+                  <a:schemeClr val="tx1"/>
+                </a:solidFill>
+              </a:rPr>
               <a:t>Mechanics</a:t>
             </a:r>
           </a:p>
@@ -5259,7 +5358,7 @@
         </p:nvSpPr>
         <p:spPr>
           <a:xfrm>
-            <a:off x="5436096" y="2204864"/>
+            <a:off x="5314482" y="2204864"/>
             <a:ext cx="1599028" cy="432048"/>
           </a:xfrm>
           <a:prstGeom prst="roundRect">
@@ -5303,7 +5402,7 @@
         </p:nvSpPr>
         <p:spPr>
           <a:xfrm>
-            <a:off x="5450948" y="2708920"/>
+            <a:off x="5329334" y="2708920"/>
             <a:ext cx="1599028" cy="432048"/>
           </a:xfrm>
           <a:prstGeom prst="roundRect">
@@ -5347,7 +5446,7 @@
         </p:nvSpPr>
         <p:spPr>
           <a:xfrm>
-            <a:off x="5470850" y="3212976"/>
+            <a:off x="5349236" y="3212976"/>
             <a:ext cx="1599028" cy="432048"/>
           </a:xfrm>
           <a:prstGeom prst="roundRect">
@@ -5428,38 +5527,74 @@
           <a:p>
             <a:pPr algn="ctr"/>
             <a:r>
-              <a:rPr lang="en-US" altLang="zh-CN" dirty="0"/>
+              <a:rPr lang="en-US" altLang="zh-CN" dirty="0">
+                <a:solidFill>
+                  <a:schemeClr val="tx1"/>
+                </a:solidFill>
+              </a:rPr>
               <a:t>Material</a:t>
             </a:r>
-            <a:endParaRPr lang="en-US" altLang="zh-CN" dirty="0" smtClean="0"/>
+            <a:endParaRPr lang="en-US" altLang="zh-CN" dirty="0" smtClean="0">
+              <a:solidFill>
+                <a:schemeClr val="tx1"/>
+              </a:solidFill>
+            </a:endParaRPr>
           </a:p>
           <a:p>
             <a:pPr algn="ctr"/>
-            <a:endParaRPr lang="en-US" altLang="zh-CN" dirty="0" smtClean="0"/>
+            <a:endParaRPr lang="en-US" altLang="zh-CN" dirty="0" smtClean="0">
+              <a:solidFill>
+                <a:schemeClr val="tx1"/>
+              </a:solidFill>
+            </a:endParaRPr>
           </a:p>
           <a:p>
             <a:pPr algn="ctr"/>
-            <a:endParaRPr lang="en-US" altLang="zh-CN" dirty="0" smtClean="0"/>
+            <a:endParaRPr lang="en-US" altLang="zh-CN" dirty="0" smtClean="0">
+              <a:solidFill>
+                <a:schemeClr val="tx1"/>
+              </a:solidFill>
+            </a:endParaRPr>
           </a:p>
           <a:p>
             <a:pPr algn="ctr"/>
-            <a:endParaRPr lang="en-US" altLang="zh-CN" dirty="0"/>
+            <a:endParaRPr lang="en-US" altLang="zh-CN" dirty="0">
+              <a:solidFill>
+                <a:schemeClr val="tx1"/>
+              </a:solidFill>
+            </a:endParaRPr>
           </a:p>
           <a:p>
             <a:pPr algn="ctr"/>
-            <a:endParaRPr lang="en-US" altLang="zh-CN" dirty="0" smtClean="0"/>
+            <a:endParaRPr lang="en-US" altLang="zh-CN" dirty="0" smtClean="0">
+              <a:solidFill>
+                <a:schemeClr val="tx1"/>
+              </a:solidFill>
+            </a:endParaRPr>
           </a:p>
           <a:p>
             <a:pPr algn="ctr"/>
-            <a:endParaRPr lang="en-US" altLang="zh-CN" dirty="0"/>
+            <a:endParaRPr lang="en-US" altLang="zh-CN" dirty="0">
+              <a:solidFill>
+                <a:schemeClr val="tx1"/>
+              </a:solidFill>
+            </a:endParaRPr>
           </a:p>
           <a:p>
             <a:pPr algn="ctr"/>
-            <a:endParaRPr lang="en-US" altLang="zh-CN" dirty="0"/>
+            <a:endParaRPr lang="en-US" altLang="zh-CN" dirty="0">
+              <a:solidFill>
+                <a:schemeClr val="tx1"/>
+              </a:solidFill>
+            </a:endParaRPr>
           </a:p>
           <a:p>
             <a:pPr algn="ctr"/>
-            <a:endParaRPr lang="en-US" altLang="zh-CN" dirty="0" smtClean="0"/>
+            <a:endParaRPr lang="en-US" altLang="zh-CN" dirty="0" smtClean="0">
+              <a:solidFill>
+                <a:schemeClr val="tx1"/>
+              </a:solidFill>
+            </a:endParaRPr>
           </a:p>
         </p:txBody>
       </p:sp>
@@ -5644,33 +5779,61 @@
           <a:p>
             <a:pPr algn="ctr"/>
             <a:r>
-              <a:rPr lang="en-US" altLang="zh-CN" dirty="0"/>
+              <a:rPr lang="en-US" altLang="zh-CN" dirty="0">
+                <a:solidFill>
+                  <a:schemeClr val="tx1"/>
+                </a:solidFill>
+              </a:rPr>
               <a:t>Foundation </a:t>
             </a:r>
             <a:r>
-              <a:rPr lang="en-US" altLang="zh-CN" dirty="0" smtClean="0"/>
+              <a:rPr lang="en-US" altLang="zh-CN" dirty="0" smtClean="0">
+                <a:solidFill>
+                  <a:schemeClr val="tx1"/>
+                </a:solidFill>
+              </a:rPr>
               <a:t>design</a:t>
             </a:r>
           </a:p>
           <a:p>
             <a:pPr algn="ctr"/>
-            <a:endParaRPr lang="en-US" altLang="zh-CN" dirty="0"/>
+            <a:endParaRPr lang="en-US" altLang="zh-CN" dirty="0">
+              <a:solidFill>
+                <a:schemeClr val="tx1"/>
+              </a:solidFill>
+            </a:endParaRPr>
           </a:p>
           <a:p>
             <a:pPr algn="ctr"/>
-            <a:endParaRPr lang="en-US" altLang="zh-CN" dirty="0" smtClean="0"/>
+            <a:endParaRPr lang="en-US" altLang="zh-CN" dirty="0" smtClean="0">
+              <a:solidFill>
+                <a:schemeClr val="tx1"/>
+              </a:solidFill>
+            </a:endParaRPr>
           </a:p>
           <a:p>
             <a:pPr algn="ctr"/>
-            <a:endParaRPr lang="en-US" altLang="zh-CN" dirty="0"/>
+            <a:endParaRPr lang="en-US" altLang="zh-CN" dirty="0">
+              <a:solidFill>
+                <a:schemeClr val="tx1"/>
+              </a:solidFill>
+            </a:endParaRPr>
           </a:p>
           <a:p>
             <a:pPr algn="ctr"/>
-            <a:endParaRPr lang="en-US" altLang="zh-CN" dirty="0"/>
+            <a:endParaRPr lang="en-US" altLang="zh-CN" dirty="0">
+              <a:solidFill>
+                <a:schemeClr val="tx1"/>
+              </a:solidFill>
+            </a:endParaRPr>
           </a:p>
           <a:p>
             <a:pPr algn="ctr"/>
-            <a:endParaRPr lang="en-US" altLang="zh-CN" dirty="0" smtClean="0"/>
+            <a:endParaRPr lang="en-US" altLang="zh-CN" dirty="0" smtClean="0">
+              <a:solidFill>
+                <a:schemeClr val="tx1"/>
+              </a:solidFill>
+            </a:endParaRPr>
           </a:p>
         </p:txBody>
       </p:sp>
@@ -6060,7 +6223,7 @@
         </p:nvCxnSpPr>
         <p:spPr>
           <a:xfrm rot="16200000" flipV="1">
-            <a:off x="1311348" y="3647315"/>
+            <a:off x="1311348" y="3719323"/>
             <a:ext cx="2789589" cy="12700"/>
           </a:xfrm>
           <a:prstGeom prst="bentConnector4">
@@ -6098,12 +6261,12 @@
         </p:nvCxnSpPr>
         <p:spPr>
           <a:xfrm rot="16200000" flipV="1">
-            <a:off x="784571" y="4174092"/>
+            <a:off x="784571" y="4246100"/>
             <a:ext cx="3836793" cy="6349"/>
           </a:xfrm>
           <a:prstGeom prst="bentConnector4">
             <a:avLst>
-              <a:gd name="adj1" fmla="val -163"/>
+              <a:gd name="adj1" fmla="val 5884"/>
               <a:gd name="adj2" fmla="val 17352717"/>
             </a:avLst>
           </a:prstGeom>
@@ -6210,7 +6373,7 @@
         </p:nvSpPr>
         <p:spPr>
           <a:xfrm>
-            <a:off x="2051720" y="1772816"/>
+            <a:off x="1979712" y="1772816"/>
             <a:ext cx="590916" cy="360040"/>
           </a:xfrm>
           <a:prstGeom prst="roundRect">
@@ -6218,6 +6381,12 @@
               <a:gd name="adj" fmla="val 0"/>
             </a:avLst>
           </a:prstGeom>
+          <a:solidFill>
+            <a:schemeClr val="tx2">
+              <a:lumMod val="40000"/>
+              <a:lumOff val="60000"/>
+            </a:schemeClr>
+          </a:solidFill>
         </p:spPr>
         <p:style>
           <a:lnRef idx="2">
@@ -6241,16 +6410,16 @@
           <a:p>
             <a:pPr algn="ctr"/>
             <a:r>
-              <a:rPr lang="en-US" b="1" dirty="0" smtClean="0">
+              <a:rPr lang="en-US" dirty="0" smtClean="0">
                 <a:solidFill>
-                  <a:srgbClr val="FF0000"/>
+                  <a:schemeClr val="tx1"/>
                 </a:solidFill>
               </a:rPr>
               <a:t>SAC</a:t>
             </a:r>
-            <a:endParaRPr lang="en-US" b="1" dirty="0">
+            <a:endParaRPr lang="en-US" dirty="0">
               <a:solidFill>
-                <a:srgbClr val="FF0000"/>
+                <a:schemeClr val="tx1"/>
               </a:solidFill>
             </a:endParaRPr>
           </a:p>
@@ -6259,18 +6428,18 @@
     </p:spTree>
     <p:extLst>
       <p:ext uri="{BB962C8B-B14F-4D97-AF65-F5344CB8AC3E}">
-        <p14:creationId xmlns:p14="http://schemas.microsoft.com/office/powerpoint/2010/main" val="3597197001"/>
+        <p14:creationId xmlns:p14="http://schemas.microsoft.com/office/powerpoint/2010/main" xmlns="" val="3597197001"/>
       </p:ext>
     </p:extLst>
   </p:cSld>
   <p:clrMapOvr>
     <a:masterClrMapping/>
   </p:clrMapOvr>
-  <mc:AlternateContent xmlns:mc="http://schemas.openxmlformats.org/markup-compatibility/2006" xmlns:p14="http://schemas.microsoft.com/office/powerpoint/2010/main">
-    <mc:Choice Requires="p14">
+  <mc:AlternateContent xmlns:mc="http://schemas.openxmlformats.org/markup-compatibility/2006">
+    <mc:Choice xmlns:p14="http://schemas.microsoft.com/office/powerpoint/2010/main" xmlns="" Requires="p14">
       <p:transition p14:dur="0"/>
     </mc:Choice>
-    <mc:Fallback xmlns="">
+    <mc:Fallback>
       <p:transition/>
     </mc:Fallback>
   </mc:AlternateContent>
@@ -6308,10 +6477,10 @@
           <p:nvPr/>
         </p:nvPicPr>
         <p:blipFill>
-          <a:blip r:embed="rId2">
+          <a:blip r:embed="rId2" cstate="print">
             <a:extLst>
               <a:ext uri="{28A0092B-C50C-407E-A947-70E740481C1C}">
-                <a14:useLocalDpi xmlns:a14="http://schemas.microsoft.com/office/drawing/2010/main" val="0"/>
+                <a14:useLocalDpi xmlns:a14="http://schemas.microsoft.com/office/drawing/2010/main" xmlns="" val="0"/>
               </a:ext>
             </a:extLst>
           </a:blip>
@@ -6389,18 +6558,18 @@
     </p:spTree>
     <p:extLst>
       <p:ext uri="{BB962C8B-B14F-4D97-AF65-F5344CB8AC3E}">
-        <p14:creationId xmlns:p14="http://schemas.microsoft.com/office/powerpoint/2010/main" val="2618846918"/>
+        <p14:creationId xmlns:p14="http://schemas.microsoft.com/office/powerpoint/2010/main" xmlns="" val="2618846918"/>
       </p:ext>
     </p:extLst>
   </p:cSld>
   <p:clrMapOvr>
     <a:masterClrMapping/>
   </p:clrMapOvr>
-  <mc:AlternateContent xmlns:mc="http://schemas.openxmlformats.org/markup-compatibility/2006" xmlns:p14="http://schemas.microsoft.com/office/powerpoint/2010/main">
-    <mc:Choice Requires="p14">
+  <mc:AlternateContent xmlns:mc="http://schemas.openxmlformats.org/markup-compatibility/2006">
+    <mc:Choice xmlns:p14="http://schemas.microsoft.com/office/powerpoint/2010/main" xmlns="" Requires="p14">
       <p:transition p14:dur="0"/>
     </mc:Choice>
-    <mc:Fallback xmlns="">
+    <mc:Fallback>
       <p:transition/>
     </mc:Fallback>
   </mc:AlternateContent>
@@ -6490,10 +6659,10 @@
           <p:nvPr/>
         </p:nvPicPr>
         <p:blipFill>
-          <a:blip r:embed="rId2">
+          <a:blip r:embed="rId2" cstate="print">
             <a:extLst>
               <a:ext uri="{28A0092B-C50C-407E-A947-70E740481C1C}">
-                <a14:useLocalDpi xmlns:a14="http://schemas.microsoft.com/office/drawing/2010/main" val="0"/>
+                <a14:useLocalDpi xmlns:a14="http://schemas.microsoft.com/office/drawing/2010/main" xmlns="" val="0"/>
               </a:ext>
             </a:extLst>
           </a:blip>
@@ -6519,18 +6688,18 @@
     </p:spTree>
     <p:extLst>
       <p:ext uri="{BB962C8B-B14F-4D97-AF65-F5344CB8AC3E}">
-        <p14:creationId xmlns:p14="http://schemas.microsoft.com/office/powerpoint/2010/main" val="89751953"/>
+        <p14:creationId xmlns:p14="http://schemas.microsoft.com/office/powerpoint/2010/main" xmlns="" val="89751953"/>
       </p:ext>
     </p:extLst>
   </p:cSld>
   <p:clrMapOvr>
     <a:masterClrMapping/>
   </p:clrMapOvr>
-  <mc:AlternateContent xmlns:mc="http://schemas.openxmlformats.org/markup-compatibility/2006" xmlns:p14="http://schemas.microsoft.com/office/powerpoint/2010/main">
-    <mc:Choice Requires="p14">
+  <mc:AlternateContent xmlns:mc="http://schemas.openxmlformats.org/markup-compatibility/2006">
+    <mc:Choice xmlns:p14="http://schemas.microsoft.com/office/powerpoint/2010/main" xmlns="" Requires="p14">
       <p:transition p14:dur="0"/>
     </mc:Choice>
-    <mc:Fallback xmlns="">
+    <mc:Fallback>
       <p:transition/>
     </mc:Fallback>
   </mc:AlternateContent>
@@ -6683,10 +6852,10 @@
           <p:nvPr/>
         </p:nvPicPr>
         <p:blipFill>
-          <a:blip r:embed="rId2">
+          <a:blip r:embed="rId2" cstate="print">
             <a:extLst>
               <a:ext uri="{28A0092B-C50C-407E-A947-70E740481C1C}">
-                <a14:useLocalDpi xmlns:a14="http://schemas.microsoft.com/office/drawing/2010/main" val="0"/>
+                <a14:useLocalDpi xmlns:a14="http://schemas.microsoft.com/office/drawing/2010/main" xmlns="" val="0"/>
               </a:ext>
             </a:extLst>
           </a:blip>
@@ -6716,10 +6885,10 @@
           <p:nvPr/>
         </p:nvPicPr>
         <p:blipFill>
-          <a:blip r:embed="rId3">
+          <a:blip r:embed="rId3" cstate="print">
             <a:extLst>
               <a:ext uri="{28A0092B-C50C-407E-A947-70E740481C1C}">
-                <a14:useLocalDpi xmlns:a14="http://schemas.microsoft.com/office/drawing/2010/main" val="0"/>
+                <a14:useLocalDpi xmlns:a14="http://schemas.microsoft.com/office/drawing/2010/main" xmlns="" val="0"/>
               </a:ext>
             </a:extLst>
           </a:blip>
@@ -6749,10 +6918,10 @@
           <p:nvPr/>
         </p:nvPicPr>
         <p:blipFill>
-          <a:blip r:embed="rId4">
+          <a:blip r:embed="rId4" cstate="print">
             <a:extLst>
               <a:ext uri="{28A0092B-C50C-407E-A947-70E740481C1C}">
-                <a14:useLocalDpi xmlns:a14="http://schemas.microsoft.com/office/drawing/2010/main" val="0"/>
+                <a14:useLocalDpi xmlns:a14="http://schemas.microsoft.com/office/drawing/2010/main" xmlns="" val="0"/>
               </a:ext>
             </a:extLst>
           </a:blip>
@@ -6778,18 +6947,18 @@
     </p:spTree>
     <p:extLst>
       <p:ext uri="{BB962C8B-B14F-4D97-AF65-F5344CB8AC3E}">
-        <p14:creationId xmlns:p14="http://schemas.microsoft.com/office/powerpoint/2010/main" val="3741350419"/>
+        <p14:creationId xmlns:p14="http://schemas.microsoft.com/office/powerpoint/2010/main" xmlns="" val="3741350419"/>
       </p:ext>
     </p:extLst>
   </p:cSld>
   <p:clrMapOvr>
     <a:masterClrMapping/>
   </p:clrMapOvr>
-  <mc:AlternateContent xmlns:mc="http://schemas.openxmlformats.org/markup-compatibility/2006" xmlns:p14="http://schemas.microsoft.com/office/powerpoint/2010/main">
-    <mc:Choice Requires="p14">
+  <mc:AlternateContent xmlns:mc="http://schemas.openxmlformats.org/markup-compatibility/2006">
+    <mc:Choice xmlns:p14="http://schemas.microsoft.com/office/powerpoint/2010/main" xmlns="" Requires="p14">
       <p:transition p14:dur="0"/>
     </mc:Choice>
-    <mc:Fallback xmlns="">
+    <mc:Fallback>
       <p:transition/>
     </mc:Fallback>
   </mc:AlternateContent>
@@ -6942,10 +7111,10 @@
           <p:nvPr/>
         </p:nvPicPr>
         <p:blipFill>
-          <a:blip r:embed="rId2">
+          <a:blip r:embed="rId2" cstate="print">
             <a:extLst>
               <a:ext uri="{28A0092B-C50C-407E-A947-70E740481C1C}">
-                <a14:useLocalDpi xmlns:a14="http://schemas.microsoft.com/office/drawing/2010/main" val="0"/>
+                <a14:useLocalDpi xmlns:a14="http://schemas.microsoft.com/office/drawing/2010/main" xmlns="" val="0"/>
               </a:ext>
             </a:extLst>
           </a:blip>
@@ -6975,10 +7144,10 @@
           <p:nvPr/>
         </p:nvPicPr>
         <p:blipFill>
-          <a:blip r:embed="rId3">
+          <a:blip r:embed="rId3" cstate="print">
             <a:extLst>
               <a:ext uri="{28A0092B-C50C-407E-A947-70E740481C1C}">
-                <a14:useLocalDpi xmlns:a14="http://schemas.microsoft.com/office/drawing/2010/main" val="0"/>
+                <a14:useLocalDpi xmlns:a14="http://schemas.microsoft.com/office/drawing/2010/main" xmlns="" val="0"/>
               </a:ext>
             </a:extLst>
           </a:blip>
@@ -7004,18 +7173,18 @@
     </p:spTree>
     <p:extLst>
       <p:ext uri="{BB962C8B-B14F-4D97-AF65-F5344CB8AC3E}">
-        <p14:creationId xmlns:p14="http://schemas.microsoft.com/office/powerpoint/2010/main" val="82955353"/>
+        <p14:creationId xmlns:p14="http://schemas.microsoft.com/office/powerpoint/2010/main" xmlns="" val="82955353"/>
       </p:ext>
     </p:extLst>
   </p:cSld>
   <p:clrMapOvr>
     <a:masterClrMapping/>
   </p:clrMapOvr>
-  <mc:AlternateContent xmlns:mc="http://schemas.openxmlformats.org/markup-compatibility/2006" xmlns:p14="http://schemas.microsoft.com/office/powerpoint/2010/main">
-    <mc:Choice Requires="p14">
+  <mc:AlternateContent xmlns:mc="http://schemas.openxmlformats.org/markup-compatibility/2006">
+    <mc:Choice xmlns:p14="http://schemas.microsoft.com/office/powerpoint/2010/main" xmlns="" Requires="p14">
       <p:transition p14:dur="0"/>
     </mc:Choice>
-    <mc:Fallback xmlns="">
+    <mc:Fallback>
       <p:transition/>
     </mc:Fallback>
   </mc:AlternateContent>
@@ -7105,10 +7274,10 @@
           <p:nvPr/>
         </p:nvPicPr>
         <p:blipFill>
-          <a:blip r:embed="rId2">
+          <a:blip r:embed="rId2" cstate="print">
             <a:extLst>
               <a:ext uri="{28A0092B-C50C-407E-A947-70E740481C1C}">
-                <a14:useLocalDpi xmlns:a14="http://schemas.microsoft.com/office/drawing/2010/main" val="0"/>
+                <a14:useLocalDpi xmlns:a14="http://schemas.microsoft.com/office/drawing/2010/main" xmlns="" val="0"/>
               </a:ext>
             </a:extLst>
           </a:blip>
@@ -7138,10 +7307,10 @@
           <p:nvPr/>
         </p:nvPicPr>
         <p:blipFill>
-          <a:blip r:embed="rId3">
+          <a:blip r:embed="rId3" cstate="print">
             <a:extLst>
               <a:ext uri="{28A0092B-C50C-407E-A947-70E740481C1C}">
-                <a14:useLocalDpi xmlns:a14="http://schemas.microsoft.com/office/drawing/2010/main" val="0"/>
+                <a14:useLocalDpi xmlns:a14="http://schemas.microsoft.com/office/drawing/2010/main" xmlns="" val="0"/>
               </a:ext>
             </a:extLst>
           </a:blip>
@@ -7171,10 +7340,10 @@
           <p:nvPr/>
         </p:nvPicPr>
         <p:blipFill>
-          <a:blip r:embed="rId4">
+          <a:blip r:embed="rId4" cstate="print">
             <a:extLst>
               <a:ext uri="{28A0092B-C50C-407E-A947-70E740481C1C}">
-                <a14:useLocalDpi xmlns:a14="http://schemas.microsoft.com/office/drawing/2010/main" val="0"/>
+                <a14:useLocalDpi xmlns:a14="http://schemas.microsoft.com/office/drawing/2010/main" xmlns="" val="0"/>
               </a:ext>
             </a:extLst>
           </a:blip>
@@ -7204,10 +7373,10 @@
           <p:nvPr/>
         </p:nvPicPr>
         <p:blipFill>
-          <a:blip r:embed="rId5">
+          <a:blip r:embed="rId5" cstate="print">
             <a:extLst>
               <a:ext uri="{28A0092B-C50C-407E-A947-70E740481C1C}">
-                <a14:useLocalDpi xmlns:a14="http://schemas.microsoft.com/office/drawing/2010/main" val="0"/>
+                <a14:useLocalDpi xmlns:a14="http://schemas.microsoft.com/office/drawing/2010/main" xmlns="" val="0"/>
               </a:ext>
             </a:extLst>
           </a:blip>
@@ -7233,18 +7402,18 @@
     </p:spTree>
     <p:extLst>
       <p:ext uri="{BB962C8B-B14F-4D97-AF65-F5344CB8AC3E}">
-        <p14:creationId xmlns:p14="http://schemas.microsoft.com/office/powerpoint/2010/main" val="2551730894"/>
+        <p14:creationId xmlns:p14="http://schemas.microsoft.com/office/powerpoint/2010/main" xmlns="" val="2551730894"/>
       </p:ext>
     </p:extLst>
   </p:cSld>
   <p:clrMapOvr>
     <a:masterClrMapping/>
   </p:clrMapOvr>
-  <mc:AlternateContent xmlns:mc="http://schemas.openxmlformats.org/markup-compatibility/2006" xmlns:p14="http://schemas.microsoft.com/office/powerpoint/2010/main">
-    <mc:Choice Requires="p14">
+  <mc:AlternateContent xmlns:mc="http://schemas.openxmlformats.org/markup-compatibility/2006">
+    <mc:Choice xmlns:p14="http://schemas.microsoft.com/office/powerpoint/2010/main" xmlns="" Requires="p14">
       <p:transition p14:dur="0"/>
     </mc:Choice>
-    <mc:Fallback xmlns="">
+    <mc:Fallback>
       <p:transition/>
     </mc:Fallback>
   </mc:AlternateContent>
@@ -7334,10 +7503,10 @@
           <p:nvPr/>
         </p:nvPicPr>
         <p:blipFill>
-          <a:blip r:embed="rId2">
+          <a:blip r:embed="rId2" cstate="print">
             <a:extLst>
               <a:ext uri="{28A0092B-C50C-407E-A947-70E740481C1C}">
-                <a14:useLocalDpi xmlns:a14="http://schemas.microsoft.com/office/drawing/2010/main" val="0"/>
+                <a14:useLocalDpi xmlns:a14="http://schemas.microsoft.com/office/drawing/2010/main" xmlns="" val="0"/>
               </a:ext>
             </a:extLst>
           </a:blip>
@@ -7367,10 +7536,10 @@
           <p:nvPr/>
         </p:nvPicPr>
         <p:blipFill>
-          <a:blip r:embed="rId3">
+          <a:blip r:embed="rId3" cstate="print">
             <a:extLst>
               <a:ext uri="{28A0092B-C50C-407E-A947-70E740481C1C}">
-                <a14:useLocalDpi xmlns:a14="http://schemas.microsoft.com/office/drawing/2010/main" val="0"/>
+                <a14:useLocalDpi xmlns:a14="http://schemas.microsoft.com/office/drawing/2010/main" xmlns="" val="0"/>
               </a:ext>
             </a:extLst>
           </a:blip>
@@ -7400,10 +7569,10 @@
           <p:nvPr/>
         </p:nvPicPr>
         <p:blipFill>
-          <a:blip r:embed="rId4">
+          <a:blip r:embed="rId4" cstate="print">
             <a:extLst>
               <a:ext uri="{28A0092B-C50C-407E-A947-70E740481C1C}">
-                <a14:useLocalDpi xmlns:a14="http://schemas.microsoft.com/office/drawing/2010/main" val="0"/>
+                <a14:useLocalDpi xmlns:a14="http://schemas.microsoft.com/office/drawing/2010/main" xmlns="" val="0"/>
               </a:ext>
             </a:extLst>
           </a:blip>
@@ -7429,18 +7598,18 @@
     </p:spTree>
     <p:extLst>
       <p:ext uri="{BB962C8B-B14F-4D97-AF65-F5344CB8AC3E}">
-        <p14:creationId xmlns:p14="http://schemas.microsoft.com/office/powerpoint/2010/main" val="3763148641"/>
+        <p14:creationId xmlns:p14="http://schemas.microsoft.com/office/powerpoint/2010/main" xmlns="" val="3763148641"/>
       </p:ext>
     </p:extLst>
   </p:cSld>
   <p:clrMapOvr>
     <a:masterClrMapping/>
   </p:clrMapOvr>
-  <mc:AlternateContent xmlns:mc="http://schemas.openxmlformats.org/markup-compatibility/2006" xmlns:p14="http://schemas.microsoft.com/office/powerpoint/2010/main">
-    <mc:Choice Requires="p14">
+  <mc:AlternateContent xmlns:mc="http://schemas.openxmlformats.org/markup-compatibility/2006">
+    <mc:Choice xmlns:p14="http://schemas.microsoft.com/office/powerpoint/2010/main" xmlns="" Requires="p14">
       <p:transition p14:dur="0"/>
     </mc:Choice>
-    <mc:Fallback xmlns="">
+    <mc:Fallback>
       <p:transition/>
     </mc:Fallback>
   </mc:AlternateContent>
@@ -7530,10 +7699,10 @@
           <p:nvPr/>
         </p:nvPicPr>
         <p:blipFill>
-          <a:blip r:embed="rId2">
+          <a:blip r:embed="rId2" cstate="print">
             <a:extLst>
               <a:ext uri="{28A0092B-C50C-407E-A947-70E740481C1C}">
-                <a14:useLocalDpi xmlns:a14="http://schemas.microsoft.com/office/drawing/2010/main" val="0"/>
+                <a14:useLocalDpi xmlns:a14="http://schemas.microsoft.com/office/drawing/2010/main" xmlns="" val="0"/>
               </a:ext>
             </a:extLst>
           </a:blip>
@@ -7563,10 +7732,10 @@
           <p:nvPr/>
         </p:nvPicPr>
         <p:blipFill>
-          <a:blip r:embed="rId3">
+          <a:blip r:embed="rId3" cstate="print">
             <a:extLst>
               <a:ext uri="{28A0092B-C50C-407E-A947-70E740481C1C}">
-                <a14:useLocalDpi xmlns:a14="http://schemas.microsoft.com/office/drawing/2010/main" val="0"/>
+                <a14:useLocalDpi xmlns:a14="http://schemas.microsoft.com/office/drawing/2010/main" xmlns="" val="0"/>
               </a:ext>
             </a:extLst>
           </a:blip>
@@ -7596,10 +7765,10 @@
           <p:nvPr/>
         </p:nvPicPr>
         <p:blipFill>
-          <a:blip r:embed="rId4">
+          <a:blip r:embed="rId4" cstate="print">
             <a:extLst>
               <a:ext uri="{28A0092B-C50C-407E-A947-70E740481C1C}">
-                <a14:useLocalDpi xmlns:a14="http://schemas.microsoft.com/office/drawing/2010/main" val="0"/>
+                <a14:useLocalDpi xmlns:a14="http://schemas.microsoft.com/office/drawing/2010/main" xmlns="" val="0"/>
               </a:ext>
             </a:extLst>
           </a:blip>
@@ -7629,10 +7798,10 @@
           <p:nvPr/>
         </p:nvPicPr>
         <p:blipFill>
-          <a:blip r:embed="rId5">
+          <a:blip r:embed="rId5" cstate="print">
             <a:extLst>
               <a:ext uri="{28A0092B-C50C-407E-A947-70E740481C1C}">
-                <a14:useLocalDpi xmlns:a14="http://schemas.microsoft.com/office/drawing/2010/main" val="0"/>
+                <a14:useLocalDpi xmlns:a14="http://schemas.microsoft.com/office/drawing/2010/main" xmlns="" val="0"/>
               </a:ext>
             </a:extLst>
           </a:blip>
@@ -7662,10 +7831,10 @@
           <p:nvPr/>
         </p:nvPicPr>
         <p:blipFill>
-          <a:blip r:embed="rId6">
+          <a:blip r:embed="rId6" cstate="print">
             <a:extLst>
               <a:ext uri="{28A0092B-C50C-407E-A947-70E740481C1C}">
-                <a14:useLocalDpi xmlns:a14="http://schemas.microsoft.com/office/drawing/2010/main" val="0"/>
+                <a14:useLocalDpi xmlns:a14="http://schemas.microsoft.com/office/drawing/2010/main" xmlns="" val="0"/>
               </a:ext>
             </a:extLst>
           </a:blip>
@@ -7691,18 +7860,18 @@
     </p:spTree>
     <p:extLst>
       <p:ext uri="{BB962C8B-B14F-4D97-AF65-F5344CB8AC3E}">
-        <p14:creationId xmlns:p14="http://schemas.microsoft.com/office/powerpoint/2010/main" val="2230135227"/>
+        <p14:creationId xmlns:p14="http://schemas.microsoft.com/office/powerpoint/2010/main" xmlns="" val="2230135227"/>
       </p:ext>
     </p:extLst>
   </p:cSld>
   <p:clrMapOvr>
     <a:masterClrMapping/>
   </p:clrMapOvr>
-  <mc:AlternateContent xmlns:mc="http://schemas.openxmlformats.org/markup-compatibility/2006" xmlns:p14="http://schemas.microsoft.com/office/powerpoint/2010/main">
-    <mc:Choice Requires="p14">
+  <mc:AlternateContent xmlns:mc="http://schemas.openxmlformats.org/markup-compatibility/2006">
+    <mc:Choice xmlns:p14="http://schemas.microsoft.com/office/powerpoint/2010/main" xmlns="" Requires="p14">
       <p:transition p14:dur="0"/>
     </mc:Choice>
-    <mc:Fallback xmlns="">
+    <mc:Fallback>
       <p:transition/>
     </mc:Fallback>
   </mc:AlternateContent>
@@ -7740,10 +7909,10 @@
           <p:nvPr/>
         </p:nvPicPr>
         <p:blipFill>
-          <a:blip r:embed="rId2">
+          <a:blip r:embed="rId2" cstate="print">
             <a:extLst>
               <a:ext uri="{28A0092B-C50C-407E-A947-70E740481C1C}">
-                <a14:useLocalDpi xmlns:a14="http://schemas.microsoft.com/office/drawing/2010/main" val="0"/>
+                <a14:useLocalDpi xmlns:a14="http://schemas.microsoft.com/office/drawing/2010/main" xmlns="" val="0"/>
               </a:ext>
             </a:extLst>
           </a:blip>
@@ -7773,10 +7942,10 @@
           <p:nvPr/>
         </p:nvPicPr>
         <p:blipFill>
-          <a:blip r:embed="rId3">
+          <a:blip r:embed="rId3" cstate="print">
             <a:extLst>
               <a:ext uri="{28A0092B-C50C-407E-A947-70E740481C1C}">
-                <a14:useLocalDpi xmlns:a14="http://schemas.microsoft.com/office/drawing/2010/main" val="0"/>
+                <a14:useLocalDpi xmlns:a14="http://schemas.microsoft.com/office/drawing/2010/main" xmlns="" val="0"/>
               </a:ext>
             </a:extLst>
           </a:blip>
@@ -7808,10 +7977,10 @@
           <p:nvPr/>
         </p:nvPicPr>
         <p:blipFill>
-          <a:blip r:embed="rId4">
+          <a:blip r:embed="rId4" cstate="print">
             <a:extLst>
               <a:ext uri="{28A0092B-C50C-407E-A947-70E740481C1C}">
-                <a14:useLocalDpi xmlns:a14="http://schemas.microsoft.com/office/drawing/2010/main" val="0"/>
+                <a14:useLocalDpi xmlns:a14="http://schemas.microsoft.com/office/drawing/2010/main" xmlns="" val="0"/>
               </a:ext>
             </a:extLst>
           </a:blip>
@@ -7831,7 +8000,7 @@
           <a:noFill/>
           <a:extLst>
             <a:ext uri="{909E8E84-426E-40DD-AFC4-6F175D3DCCD1}">
-              <a14:hiddenFill xmlns:a14="http://schemas.microsoft.com/office/drawing/2010/main">
+              <a14:hiddenFill xmlns:a14="http://schemas.microsoft.com/office/drawing/2010/main" xmlns="">
                 <a:solidFill>
                   <a:srgbClr val="FFFFFF"/>
                 </a:solidFill>
@@ -7849,10 +8018,10 @@
           <p:nvPr/>
         </p:nvPicPr>
         <p:blipFill>
-          <a:blip r:embed="rId5">
+          <a:blip r:embed="rId5" cstate="print">
             <a:extLst>
               <a:ext uri="{28A0092B-C50C-407E-A947-70E740481C1C}">
-                <a14:useLocalDpi xmlns:a14="http://schemas.microsoft.com/office/drawing/2010/main" val="0"/>
+                <a14:useLocalDpi xmlns:a14="http://schemas.microsoft.com/office/drawing/2010/main" xmlns="" val="0"/>
               </a:ext>
             </a:extLst>
           </a:blip>
@@ -7872,7 +8041,7 @@
           <a:noFill/>
           <a:extLst>
             <a:ext uri="{909E8E84-426E-40DD-AFC4-6F175D3DCCD1}">
-              <a14:hiddenFill xmlns:a14="http://schemas.microsoft.com/office/drawing/2010/main">
+              <a14:hiddenFill xmlns:a14="http://schemas.microsoft.com/office/drawing/2010/main" xmlns="">
                 <a:solidFill>
                   <a:srgbClr val="FFFFFF"/>
                 </a:solidFill>
@@ -7884,18 +8053,18 @@
     </p:spTree>
     <p:extLst>
       <p:ext uri="{BB962C8B-B14F-4D97-AF65-F5344CB8AC3E}">
-        <p14:creationId xmlns:p14="http://schemas.microsoft.com/office/powerpoint/2010/main" val="1649796620"/>
+        <p14:creationId xmlns:p14="http://schemas.microsoft.com/office/powerpoint/2010/main" xmlns="" val="1649796620"/>
       </p:ext>
     </p:extLst>
   </p:cSld>
   <p:clrMapOvr>
     <a:masterClrMapping/>
   </p:clrMapOvr>
-  <mc:AlternateContent xmlns:mc="http://schemas.openxmlformats.org/markup-compatibility/2006" xmlns:p14="http://schemas.microsoft.com/office/powerpoint/2010/main">
-    <mc:Choice Requires="p14">
+  <mc:AlternateContent xmlns:mc="http://schemas.openxmlformats.org/markup-compatibility/2006">
+    <mc:Choice xmlns:p14="http://schemas.microsoft.com/office/powerpoint/2010/main" xmlns="" Requires="p14">
       <p:transition p14:dur="0"/>
     </mc:Choice>
-    <mc:Fallback xmlns="">
+    <mc:Fallback>
       <p:transition/>
     </mc:Fallback>
   </mc:AlternateContent>

</xml_diff>

<commit_message>
Bridge Research: added product portfolio page.
[git-p4: depot-paths = "//isd/dev/civil/c3d/users/huangt/": change = 278826]
</commit_message>
<xml_diff>
--- a/Bridge Design.pptx
+++ b/Bridge Design.pptx
@@ -7,10 +7,10 @@
     <p:sldMasterId id="2147483693" r:id="rId6"/>
   </p:sldMasterIdLst>
   <p:notesMasterIdLst>
-    <p:notesMasterId r:id="rId20"/>
+    <p:notesMasterId r:id="rId21"/>
   </p:notesMasterIdLst>
   <p:handoutMasterIdLst>
-    <p:handoutMasterId r:id="rId21"/>
+    <p:handoutMasterId r:id="rId22"/>
   </p:handoutMasterIdLst>
   <p:sldIdLst>
     <p:sldId id="339" r:id="rId7"/>
@@ -25,12 +25,13 @@
     <p:sldId id="435" r:id="rId16"/>
     <p:sldId id="436" r:id="rId17"/>
     <p:sldId id="446" r:id="rId18"/>
-    <p:sldId id="424" r:id="rId19"/>
+    <p:sldId id="447" r:id="rId19"/>
+    <p:sldId id="424" r:id="rId20"/>
   </p:sldIdLst>
   <p:sldSz cx="13011150" cy="9756775"/>
   <p:notesSz cx="6858000" cy="9296400"/>
   <p:custDataLst>
-    <p:tags r:id="rId22"/>
+    <p:tags r:id="rId23"/>
   </p:custDataLst>
   <p:defaultTextStyle>
     <a:defPPr>
@@ -271,7 +272,7 @@
               <a:pPr>
                 <a:defRPr/>
               </a:pPr>
-              <a:t>8/5/2011</a:t>
+              <a:t>8/22/2011</a:t>
             </a:fld>
             <a:endParaRPr lang="en-US" dirty="0"/>
           </a:p>
@@ -375,7 +376,7 @@
     </p:spTree>
     <p:extLst>
       <p:ext uri="{BB962C8B-B14F-4D97-AF65-F5344CB8AC3E}">
-        <p14:creationId xmlns:p14="http://schemas.microsoft.com/office/powerpoint/2010/main" val="3767017763"/>
+        <p14:creationId xmlns:p14="http://schemas.microsoft.com/office/powerpoint/2010/main" xmlns="" val="3767017763"/>
       </p:ext>
     </p:extLst>
   </p:cSld>
@@ -494,7 +495,7 @@
               <a:pPr>
                 <a:defRPr/>
               </a:pPr>
-              <a:t>8/5/2011</a:t>
+              <a:t>8/22/2011</a:t>
             </a:fld>
             <a:endParaRPr lang="en-US" dirty="0"/>
           </a:p>
@@ -694,7 +695,7 @@
     </p:spTree>
     <p:extLst>
       <p:ext uri="{BB962C8B-B14F-4D97-AF65-F5344CB8AC3E}">
-        <p14:creationId xmlns:p14="http://schemas.microsoft.com/office/powerpoint/2010/main" val="2651238526"/>
+        <p14:creationId xmlns:p14="http://schemas.microsoft.com/office/powerpoint/2010/main" xmlns="" val="2651238526"/>
       </p:ext>
     </p:extLst>
   </p:cSld>
@@ -1061,7 +1062,7 @@
     </p:spTree>
     <p:extLst>
       <p:ext uri="{BB962C8B-B14F-4D97-AF65-F5344CB8AC3E}">
-        <p14:creationId xmlns:p14="http://schemas.microsoft.com/office/powerpoint/2010/main" val="1498072389"/>
+        <p14:creationId xmlns:p14="http://schemas.microsoft.com/office/powerpoint/2010/main" xmlns="" val="1498072389"/>
       </p:ext>
     </p:extLst>
   </p:cSld>
@@ -1159,7 +1160,7 @@
     </p:spTree>
     <p:extLst>
       <p:ext uri="{BB962C8B-B14F-4D97-AF65-F5344CB8AC3E}">
-        <p14:creationId xmlns:p14="http://schemas.microsoft.com/office/powerpoint/2010/main" val="809683830"/>
+        <p14:creationId xmlns:p14="http://schemas.microsoft.com/office/powerpoint/2010/main" xmlns="" val="809683830"/>
       </p:ext>
     </p:extLst>
   </p:cSld>
@@ -1319,7 +1320,7 @@
     </p:spTree>
     <p:extLst>
       <p:ext uri="{BB962C8B-B14F-4D97-AF65-F5344CB8AC3E}">
-        <p14:creationId xmlns:p14="http://schemas.microsoft.com/office/powerpoint/2010/main" val="2100139021"/>
+        <p14:creationId xmlns:p14="http://schemas.microsoft.com/office/powerpoint/2010/main" xmlns="" val="2100139021"/>
       </p:ext>
     </p:extLst>
   </p:cSld>
@@ -1441,7 +1442,7 @@
     </p:spTree>
     <p:extLst>
       <p:ext uri="{BB962C8B-B14F-4D97-AF65-F5344CB8AC3E}">
-        <p14:creationId xmlns:p14="http://schemas.microsoft.com/office/powerpoint/2010/main" val="1426405352"/>
+        <p14:creationId xmlns:p14="http://schemas.microsoft.com/office/powerpoint/2010/main" xmlns="" val="1426405352"/>
       </p:ext>
     </p:extLst>
   </p:cSld>
@@ -1627,7 +1628,7 @@
     </p:spTree>
     <p:extLst>
       <p:ext uri="{BB962C8B-B14F-4D97-AF65-F5344CB8AC3E}">
-        <p14:creationId xmlns:p14="http://schemas.microsoft.com/office/powerpoint/2010/main" val="2844708269"/>
+        <p14:creationId xmlns:p14="http://schemas.microsoft.com/office/powerpoint/2010/main" xmlns="" val="2844708269"/>
       </p:ext>
     </p:extLst>
   </p:cSld>
@@ -1837,7 +1838,7 @@
     </p:spTree>
     <p:extLst>
       <p:ext uri="{BB962C8B-B14F-4D97-AF65-F5344CB8AC3E}">
-        <p14:creationId xmlns:p14="http://schemas.microsoft.com/office/powerpoint/2010/main" val="2431113566"/>
+        <p14:creationId xmlns:p14="http://schemas.microsoft.com/office/powerpoint/2010/main" xmlns="" val="2431113566"/>
       </p:ext>
     </p:extLst>
   </p:cSld>
@@ -2011,7 +2012,7 @@
     </p:spTree>
     <p:extLst>
       <p:ext uri="{BB962C8B-B14F-4D97-AF65-F5344CB8AC3E}">
-        <p14:creationId xmlns:p14="http://schemas.microsoft.com/office/powerpoint/2010/main" val="3177533531"/>
+        <p14:creationId xmlns:p14="http://schemas.microsoft.com/office/powerpoint/2010/main" xmlns="" val="3177533531"/>
       </p:ext>
     </p:extLst>
   </p:cSld>
@@ -2149,7 +2150,7 @@
     </p:spTree>
     <p:extLst>
       <p:ext uri="{BB962C8B-B14F-4D97-AF65-F5344CB8AC3E}">
-        <p14:creationId xmlns:p14="http://schemas.microsoft.com/office/powerpoint/2010/main" val="914220304"/>
+        <p14:creationId xmlns:p14="http://schemas.microsoft.com/office/powerpoint/2010/main" xmlns="" val="914220304"/>
       </p:ext>
     </p:extLst>
   </p:cSld>
@@ -2301,7 +2302,7 @@
     </p:spTree>
     <p:extLst>
       <p:ext uri="{BB962C8B-B14F-4D97-AF65-F5344CB8AC3E}">
-        <p14:creationId xmlns:p14="http://schemas.microsoft.com/office/powerpoint/2010/main" val="2621413730"/>
+        <p14:creationId xmlns:p14="http://schemas.microsoft.com/office/powerpoint/2010/main" xmlns="" val="2621413730"/>
       </p:ext>
     </p:extLst>
   </p:cSld>
@@ -2411,7 +2412,7 @@
     </p:spTree>
     <p:extLst>
       <p:ext uri="{BB962C8B-B14F-4D97-AF65-F5344CB8AC3E}">
-        <p14:creationId xmlns:p14="http://schemas.microsoft.com/office/powerpoint/2010/main" val="2339271274"/>
+        <p14:creationId xmlns:p14="http://schemas.microsoft.com/office/powerpoint/2010/main" xmlns="" val="2339271274"/>
       </p:ext>
     </p:extLst>
   </p:cSld>
@@ -2521,7 +2522,7 @@
     </p:spTree>
     <p:extLst>
       <p:ext uri="{BB962C8B-B14F-4D97-AF65-F5344CB8AC3E}">
-        <p14:creationId xmlns:p14="http://schemas.microsoft.com/office/powerpoint/2010/main" val="1558036604"/>
+        <p14:creationId xmlns:p14="http://schemas.microsoft.com/office/powerpoint/2010/main" xmlns="" val="1558036604"/>
       </p:ext>
     </p:extLst>
   </p:cSld>
@@ -6331,7 +6332,7 @@
           <p:nvPr/>
         </p:nvPicPr>
         <p:blipFill>
-          <a:blip r:embed="rId3"/>
+          <a:blip r:embed="rId3" cstate="print"/>
           <a:srcRect/>
           <a:stretch>
             <a:fillRect/>
@@ -6387,10 +6388,10 @@
           <p:nvPr/>
         </p:nvPicPr>
         <p:blipFill>
-          <a:blip r:embed="rId5">
+          <a:blip r:embed="rId5" cstate="print">
             <a:extLst>
               <a:ext uri="{28A0092B-C50C-407E-A947-70E740481C1C}">
-                <a14:useLocalDpi xmlns:a14="http://schemas.microsoft.com/office/drawing/2010/main" val="0"/>
+                <a14:useLocalDpi xmlns:a14="http://schemas.microsoft.com/office/drawing/2010/main" xmlns="" val="0"/>
               </a:ext>
             </a:extLst>
           </a:blip>
@@ -6410,7 +6411,7 @@
           <a:noFill/>
           <a:extLst>
             <a:ext uri="{909E8E84-426E-40DD-AFC4-6F175D3DCCD1}">
-              <a14:hiddenFill xmlns:a14="http://schemas.microsoft.com/office/drawing/2010/main">
+              <a14:hiddenFill xmlns:a14="http://schemas.microsoft.com/office/drawing/2010/main" xmlns="">
                 <a:solidFill>
                   <a:srgbClr val="FFFFFF"/>
                 </a:solidFill>
@@ -6428,10 +6429,10 @@
           <p:nvPr/>
         </p:nvPicPr>
         <p:blipFill>
-          <a:blip r:embed="rId6">
+          <a:blip r:embed="rId6" cstate="print">
             <a:extLst>
               <a:ext uri="{28A0092B-C50C-407E-A947-70E740481C1C}">
-                <a14:useLocalDpi xmlns:a14="http://schemas.microsoft.com/office/drawing/2010/main" val="0"/>
+                <a14:useLocalDpi xmlns:a14="http://schemas.microsoft.com/office/drawing/2010/main" xmlns="" val="0"/>
               </a:ext>
             </a:extLst>
           </a:blip>
@@ -6451,7 +6452,7 @@
           <a:noFill/>
           <a:extLst>
             <a:ext uri="{909E8E84-426E-40DD-AFC4-6F175D3DCCD1}">
-              <a14:hiddenFill xmlns:a14="http://schemas.microsoft.com/office/drawing/2010/main">
+              <a14:hiddenFill xmlns:a14="http://schemas.microsoft.com/office/drawing/2010/main" xmlns="">
                 <a:solidFill>
                   <a:srgbClr val="FFFFFF"/>
                 </a:solidFill>
@@ -6463,7 +6464,7 @@
     </p:spTree>
     <p:extLst>
       <p:ext uri="{BB962C8B-B14F-4D97-AF65-F5344CB8AC3E}">
-        <p14:creationId xmlns:p14="http://schemas.microsoft.com/office/powerpoint/2010/main" val="737658934"/>
+        <p14:creationId xmlns:p14="http://schemas.microsoft.com/office/powerpoint/2010/main" xmlns="" val="737658934"/>
       </p:ext>
     </p:extLst>
   </p:cSld>
@@ -6810,10 +6811,10 @@
           <p:nvPr/>
         </p:nvPicPr>
         <p:blipFill>
-          <a:blip r:embed="rId3">
+          <a:blip r:embed="rId3" cstate="print">
             <a:extLst>
               <a:ext uri="{28A0092B-C50C-407E-A947-70E740481C1C}">
-                <a14:useLocalDpi xmlns:a14="http://schemas.microsoft.com/office/drawing/2010/main" val="0"/>
+                <a14:useLocalDpi xmlns:a14="http://schemas.microsoft.com/office/drawing/2010/main" xmlns="" val="0"/>
               </a:ext>
             </a:extLst>
           </a:blip>
@@ -6833,7 +6834,7 @@
           <a:noFill/>
           <a:extLst>
             <a:ext uri="{909E8E84-426E-40DD-AFC4-6F175D3DCCD1}">
-              <a14:hiddenFill xmlns:a14="http://schemas.microsoft.com/office/drawing/2010/main">
+              <a14:hiddenFill xmlns:a14="http://schemas.microsoft.com/office/drawing/2010/main" xmlns="">
                 <a:solidFill>
                   <a:srgbClr val="FFFFFF"/>
                 </a:solidFill>
@@ -6851,10 +6852,10 @@
           <p:nvPr/>
         </p:nvPicPr>
         <p:blipFill>
-          <a:blip r:embed="rId4">
+          <a:blip r:embed="rId4" cstate="print">
             <a:extLst>
               <a:ext uri="{28A0092B-C50C-407E-A947-70E740481C1C}">
-                <a14:useLocalDpi xmlns:a14="http://schemas.microsoft.com/office/drawing/2010/main" val="0"/>
+                <a14:useLocalDpi xmlns:a14="http://schemas.microsoft.com/office/drawing/2010/main" xmlns="" val="0"/>
               </a:ext>
             </a:extLst>
           </a:blip>
@@ -6874,7 +6875,7 @@
           <a:noFill/>
           <a:extLst>
             <a:ext uri="{909E8E84-426E-40DD-AFC4-6F175D3DCCD1}">
-              <a14:hiddenFill xmlns:a14="http://schemas.microsoft.com/office/drawing/2010/main">
+              <a14:hiddenFill xmlns:a14="http://schemas.microsoft.com/office/drawing/2010/main" xmlns="">
                 <a:solidFill>
                   <a:srgbClr val="FFFFFF"/>
                 </a:solidFill>
@@ -6892,10 +6893,10 @@
           <p:nvPr/>
         </p:nvPicPr>
         <p:blipFill>
-          <a:blip r:embed="rId5">
+          <a:blip r:embed="rId5" cstate="print">
             <a:extLst>
               <a:ext uri="{28A0092B-C50C-407E-A947-70E740481C1C}">
-                <a14:useLocalDpi xmlns:a14="http://schemas.microsoft.com/office/drawing/2010/main" val="0"/>
+                <a14:useLocalDpi xmlns:a14="http://schemas.microsoft.com/office/drawing/2010/main" xmlns="" val="0"/>
               </a:ext>
             </a:extLst>
           </a:blip>
@@ -6915,7 +6916,7 @@
           <a:noFill/>
           <a:extLst>
             <a:ext uri="{909E8E84-426E-40DD-AFC4-6F175D3DCCD1}">
-              <a14:hiddenFill xmlns:a14="http://schemas.microsoft.com/office/drawing/2010/main">
+              <a14:hiddenFill xmlns:a14="http://schemas.microsoft.com/office/drawing/2010/main" xmlns="">
                 <a:solidFill>
                   <a:srgbClr val="FFFFFF"/>
                 </a:solidFill>
@@ -6933,10 +6934,10 @@
           <p:nvPr/>
         </p:nvPicPr>
         <p:blipFill>
-          <a:blip r:embed="rId6">
+          <a:blip r:embed="rId6" cstate="print">
             <a:extLst>
               <a:ext uri="{28A0092B-C50C-407E-A947-70E740481C1C}">
-                <a14:useLocalDpi xmlns:a14="http://schemas.microsoft.com/office/drawing/2010/main" val="0"/>
+                <a14:useLocalDpi xmlns:a14="http://schemas.microsoft.com/office/drawing/2010/main" xmlns="" val="0"/>
               </a:ext>
             </a:extLst>
           </a:blip>
@@ -6956,7 +6957,7 @@
           <a:noFill/>
           <a:extLst>
             <a:ext uri="{909E8E84-426E-40DD-AFC4-6F175D3DCCD1}">
-              <a14:hiddenFill xmlns:a14="http://schemas.microsoft.com/office/drawing/2010/main">
+              <a14:hiddenFill xmlns:a14="http://schemas.microsoft.com/office/drawing/2010/main" xmlns="">
                 <a:solidFill>
                   <a:srgbClr val="FFFFFF"/>
                 </a:solidFill>
@@ -6974,10 +6975,10 @@
           <p:nvPr/>
         </p:nvPicPr>
         <p:blipFill>
-          <a:blip r:embed="rId7">
+          <a:blip r:embed="rId7" cstate="print">
             <a:extLst>
               <a:ext uri="{28A0092B-C50C-407E-A947-70E740481C1C}">
-                <a14:useLocalDpi xmlns:a14="http://schemas.microsoft.com/office/drawing/2010/main" val="0"/>
+                <a14:useLocalDpi xmlns:a14="http://schemas.microsoft.com/office/drawing/2010/main" xmlns="" val="0"/>
               </a:ext>
             </a:extLst>
           </a:blip>
@@ -6997,7 +6998,7 @@
           <a:noFill/>
           <a:extLst>
             <a:ext uri="{909E8E84-426E-40DD-AFC4-6F175D3DCCD1}">
-              <a14:hiddenFill xmlns:a14="http://schemas.microsoft.com/office/drawing/2010/main">
+              <a14:hiddenFill xmlns:a14="http://schemas.microsoft.com/office/drawing/2010/main" xmlns="">
                 <a:solidFill>
                   <a:srgbClr val="FFFFFF"/>
                 </a:solidFill>
@@ -7015,10 +7016,10 @@
           <p:nvPr/>
         </p:nvPicPr>
         <p:blipFill>
-          <a:blip r:embed="rId8">
+          <a:blip r:embed="rId8" cstate="print">
             <a:extLst>
               <a:ext uri="{28A0092B-C50C-407E-A947-70E740481C1C}">
-                <a14:useLocalDpi xmlns:a14="http://schemas.microsoft.com/office/drawing/2010/main" val="0"/>
+                <a14:useLocalDpi xmlns:a14="http://schemas.microsoft.com/office/drawing/2010/main" xmlns="" val="0"/>
               </a:ext>
             </a:extLst>
           </a:blip>
@@ -7038,7 +7039,7 @@
           <a:noFill/>
           <a:extLst>
             <a:ext uri="{909E8E84-426E-40DD-AFC4-6F175D3DCCD1}">
-              <a14:hiddenFill xmlns:a14="http://schemas.microsoft.com/office/drawing/2010/main">
+              <a14:hiddenFill xmlns:a14="http://schemas.microsoft.com/office/drawing/2010/main" xmlns="">
                 <a:solidFill>
                   <a:srgbClr val="FFFFFF"/>
                 </a:solidFill>
@@ -7050,7 +7051,7 @@
     </p:spTree>
     <p:extLst>
       <p:ext uri="{BB962C8B-B14F-4D97-AF65-F5344CB8AC3E}">
-        <p14:creationId xmlns:p14="http://schemas.microsoft.com/office/powerpoint/2010/main" val="363243169"/>
+        <p14:creationId xmlns:p14="http://schemas.microsoft.com/office/powerpoint/2010/main" xmlns="" val="363243169"/>
       </p:ext>
     </p:extLst>
   </p:cSld>
@@ -7992,7 +7993,7 @@
     </p:spTree>
     <p:extLst>
       <p:ext uri="{BB962C8B-B14F-4D97-AF65-F5344CB8AC3E}">
-        <p14:creationId xmlns:p14="http://schemas.microsoft.com/office/powerpoint/2010/main" val="2713535703"/>
+        <p14:creationId xmlns:p14="http://schemas.microsoft.com/office/powerpoint/2010/main" xmlns="" val="2713535703"/>
       </p:ext>
     </p:extLst>
   </p:cSld>
@@ -8280,6 +8281,274 @@
       </p:grpSpPr>
       <p:sp>
         <p:nvSpPr>
+          <p:cNvPr id="2" name="Title 1"/>
+          <p:cNvSpPr>
+            <a:spLocks noGrp="1"/>
+          </p:cNvSpPr>
+          <p:nvPr>
+            <p:ph type="title"/>
+          </p:nvPr>
+        </p:nvSpPr>
+        <p:spPr/>
+        <p:txBody>
+          <a:bodyPr/>
+          <a:lstStyle/>
+          <a:p>
+            <a:r>
+              <a:rPr lang="en-US" dirty="0" smtClean="0"/>
+              <a:t>Product Portfolio</a:t>
+            </a:r>
+            <a:endParaRPr lang="en-US" dirty="0"/>
+          </a:p>
+        </p:txBody>
+      </p:sp>
+      <p:sp>
+        <p:nvSpPr>
+          <p:cNvPr id="3" name="Content Placeholder 2"/>
+          <p:cNvSpPr>
+            <a:spLocks noGrp="1"/>
+          </p:cNvSpPr>
+          <p:nvPr>
+            <p:ph idx="1"/>
+          </p:nvPr>
+        </p:nvSpPr>
+        <p:spPr/>
+        <p:txBody>
+          <a:bodyPr/>
+          <a:lstStyle/>
+          <a:p>
+            <a:endParaRPr lang="en-US" dirty="0"/>
+          </a:p>
+        </p:txBody>
+      </p:sp>
+      <p:pic>
+        <p:nvPicPr>
+          <p:cNvPr id="4" name="Picture 2"/>
+          <p:cNvPicPr>
+            <a:picLocks noChangeAspect="1" noChangeArrowheads="1"/>
+          </p:cNvPicPr>
+          <p:nvPr/>
+        </p:nvPicPr>
+        <p:blipFill>
+          <a:blip r:embed="rId2" cstate="print"/>
+          <a:srcRect/>
+          <a:stretch>
+            <a:fillRect/>
+          </a:stretch>
+        </p:blipFill>
+        <p:spPr bwMode="auto">
+          <a:xfrm>
+            <a:off x="561975" y="2116992"/>
+            <a:ext cx="9220200" cy="6770161"/>
+          </a:xfrm>
+          <a:prstGeom prst="rect">
+            <a:avLst/>
+          </a:prstGeom>
+          <a:noFill/>
+          <a:ln w="9525">
+            <a:noFill/>
+            <a:miter lim="800000"/>
+            <a:headEnd/>
+            <a:tailEnd/>
+          </a:ln>
+        </p:spPr>
+      </p:pic>
+      <p:pic>
+        <p:nvPicPr>
+          <p:cNvPr id="5" name="Picture 2"/>
+          <p:cNvPicPr>
+            <a:picLocks noChangeAspect="1" noChangeArrowheads="1"/>
+          </p:cNvPicPr>
+          <p:nvPr/>
+        </p:nvPicPr>
+        <p:blipFill>
+          <a:blip r:embed="rId3" cstate="print"/>
+          <a:srcRect/>
+          <a:stretch>
+            <a:fillRect/>
+          </a:stretch>
+        </p:blipFill>
+        <p:spPr bwMode="auto">
+          <a:xfrm>
+            <a:off x="561975" y="2115295"/>
+            <a:ext cx="9220200" cy="6770160"/>
+          </a:xfrm>
+          <a:prstGeom prst="rect">
+            <a:avLst/>
+          </a:prstGeom>
+          <a:noFill/>
+          <a:ln w="9525">
+            <a:noFill/>
+            <a:miter lim="800000"/>
+            <a:headEnd/>
+            <a:tailEnd/>
+          </a:ln>
+        </p:spPr>
+      </p:pic>
+    </p:spTree>
+  </p:cSld>
+  <p:clrMapOvr>
+    <a:masterClrMapping/>
+  </p:clrMapOvr>
+  <p:transition/>
+  <p:timing>
+    <p:tnLst>
+      <p:par>
+        <p:cTn id="1" dur="indefinite" restart="never" nodeType="tmRoot">
+          <p:childTnLst>
+            <p:seq concurrent="1" nextAc="seek">
+              <p:cTn id="2" dur="indefinite" nodeType="mainSeq">
+                <p:childTnLst>
+                  <p:par>
+                    <p:cTn id="3" fill="hold">
+                      <p:stCondLst>
+                        <p:cond delay="indefinite"/>
+                      </p:stCondLst>
+                      <p:childTnLst>
+                        <p:par>
+                          <p:cTn id="4" fill="hold">
+                            <p:stCondLst>
+                              <p:cond delay="0"/>
+                            </p:stCondLst>
+                            <p:childTnLst>
+                              <p:par>
+                                <p:cTn id="5" presetID="3" presetClass="entr" presetSubtype="10" fill="hold" nodeType="clickEffect">
+                                  <p:stCondLst>
+                                    <p:cond delay="0"/>
+                                  </p:stCondLst>
+                                  <p:childTnLst>
+                                    <p:set>
+                                      <p:cBhvr>
+                                        <p:cTn id="6" dur="1" fill="hold">
+                                          <p:stCondLst>
+                                            <p:cond delay="0"/>
+                                          </p:stCondLst>
+                                        </p:cTn>
+                                        <p:tgtEl>
+                                          <p:spTgt spid="4"/>
+                                        </p:tgtEl>
+                                        <p:attrNameLst>
+                                          <p:attrName>style.visibility</p:attrName>
+                                        </p:attrNameLst>
+                                      </p:cBhvr>
+                                      <p:to>
+                                        <p:strVal val="visible"/>
+                                      </p:to>
+                                    </p:set>
+                                    <p:animEffect transition="in" filter="blinds(horizontal)">
+                                      <p:cBhvr>
+                                        <p:cTn id="7" dur="500"/>
+                                        <p:tgtEl>
+                                          <p:spTgt spid="4"/>
+                                        </p:tgtEl>
+                                      </p:cBhvr>
+                                    </p:animEffect>
+                                  </p:childTnLst>
+                                </p:cTn>
+                              </p:par>
+                            </p:childTnLst>
+                          </p:cTn>
+                        </p:par>
+                      </p:childTnLst>
+                    </p:cTn>
+                  </p:par>
+                  <p:par>
+                    <p:cTn id="8" fill="hold">
+                      <p:stCondLst>
+                        <p:cond delay="indefinite"/>
+                      </p:stCondLst>
+                      <p:childTnLst>
+                        <p:par>
+                          <p:cTn id="9" fill="hold">
+                            <p:stCondLst>
+                              <p:cond delay="0"/>
+                            </p:stCondLst>
+                            <p:childTnLst>
+                              <p:par>
+                                <p:cTn id="10" presetID="3" presetClass="entr" presetSubtype="10" fill="hold" nodeType="clickEffect">
+                                  <p:stCondLst>
+                                    <p:cond delay="0"/>
+                                  </p:stCondLst>
+                                  <p:childTnLst>
+                                    <p:set>
+                                      <p:cBhvr>
+                                        <p:cTn id="11" dur="1" fill="hold">
+                                          <p:stCondLst>
+                                            <p:cond delay="0"/>
+                                          </p:stCondLst>
+                                        </p:cTn>
+                                        <p:tgtEl>
+                                          <p:spTgt spid="5"/>
+                                        </p:tgtEl>
+                                        <p:attrNameLst>
+                                          <p:attrName>style.visibility</p:attrName>
+                                        </p:attrNameLst>
+                                      </p:cBhvr>
+                                      <p:to>
+                                        <p:strVal val="visible"/>
+                                      </p:to>
+                                    </p:set>
+                                    <p:animEffect transition="in" filter="blinds(horizontal)">
+                                      <p:cBhvr>
+                                        <p:cTn id="12" dur="500"/>
+                                        <p:tgtEl>
+                                          <p:spTgt spid="5"/>
+                                        </p:tgtEl>
+                                      </p:cBhvr>
+                                    </p:animEffect>
+                                  </p:childTnLst>
+                                </p:cTn>
+                              </p:par>
+                            </p:childTnLst>
+                          </p:cTn>
+                        </p:par>
+                      </p:childTnLst>
+                    </p:cTn>
+                  </p:par>
+                </p:childTnLst>
+              </p:cTn>
+              <p:prevCondLst>
+                <p:cond evt="onPrev" delay="0">
+                  <p:tgtEl>
+                    <p:sldTgt/>
+                  </p:tgtEl>
+                </p:cond>
+              </p:prevCondLst>
+              <p:nextCondLst>
+                <p:cond evt="onNext" delay="0">
+                  <p:tgtEl>
+                    <p:sldTgt/>
+                  </p:tgtEl>
+                </p:cond>
+              </p:nextCondLst>
+            </p:seq>
+          </p:childTnLst>
+        </p:cTn>
+      </p:par>
+    </p:tnLst>
+  </p:timing>
+</p:sld>
+</file>
+
+<file path=ppt/slides/slide14.xml><?xml version="1.0" encoding="utf-8"?>
+<p:sld xmlns:a="http://schemas.openxmlformats.org/drawingml/2006/main" xmlns:r="http://schemas.openxmlformats.org/officeDocument/2006/relationships" xmlns:p="http://schemas.openxmlformats.org/presentationml/2006/main">
+  <p:cSld>
+    <p:spTree>
+      <p:nvGrpSpPr>
+        <p:cNvPr id="1" name=""/>
+        <p:cNvGrpSpPr/>
+        <p:nvPr/>
+      </p:nvGrpSpPr>
+      <p:grpSpPr>
+        <a:xfrm>
+          <a:off x="0" y="0"/>
+          <a:ext cx="0" cy="0"/>
+          <a:chOff x="0" y="0"/>
+          <a:chExt cx="0" cy="0"/>
+        </a:xfrm>
+      </p:grpSpPr>
+      <p:sp>
+        <p:nvSpPr>
           <p:cNvPr id="4" name="Title 3"/>
           <p:cNvSpPr>
             <a:spLocks noGrp="1"/>
@@ -8305,7 +8574,7 @@
     </p:spTree>
     <p:extLst>
       <p:ext uri="{BB962C8B-B14F-4D97-AF65-F5344CB8AC3E}">
-        <p14:creationId xmlns:p14="http://schemas.microsoft.com/office/powerpoint/2010/main" val="1308470607"/>
+        <p14:creationId xmlns:p14="http://schemas.microsoft.com/office/powerpoint/2010/main" xmlns="" val="1308470607"/>
       </p:ext>
     </p:extLst>
   </p:cSld>
@@ -8430,7 +8699,7 @@
           <p:nvPr/>
         </p:nvPicPr>
         <p:blipFill>
-          <a:blip r:embed="rId3"/>
+          <a:blip r:embed="rId3" cstate="print"/>
           <a:srcRect/>
           <a:stretch>
             <a:fillRect/>
@@ -8456,7 +8725,7 @@
     </p:spTree>
     <p:extLst>
       <p:ext uri="{BB962C8B-B14F-4D97-AF65-F5344CB8AC3E}">
-        <p14:creationId xmlns:p14="http://schemas.microsoft.com/office/powerpoint/2010/main" val="3254267978"/>
+        <p14:creationId xmlns:p14="http://schemas.microsoft.com/office/powerpoint/2010/main" xmlns="" val="3254267978"/>
       </p:ext>
     </p:extLst>
   </p:cSld>
@@ -8594,10 +8863,10 @@
           <p:nvPr/>
         </p:nvPicPr>
         <p:blipFill>
-          <a:blip r:embed="rId3">
+          <a:blip r:embed="rId3" cstate="print">
             <a:extLst>
               <a:ext uri="{28A0092B-C50C-407E-A947-70E740481C1C}">
-                <a14:useLocalDpi xmlns:a14="http://schemas.microsoft.com/office/drawing/2010/main" val="0"/>
+                <a14:useLocalDpi xmlns:a14="http://schemas.microsoft.com/office/drawing/2010/main" xmlns="" val="0"/>
               </a:ext>
             </a:extLst>
           </a:blip>
@@ -8617,7 +8886,7 @@
           <a:noFill/>
           <a:extLst>
             <a:ext uri="{909E8E84-426E-40DD-AFC4-6F175D3DCCD1}">
-              <a14:hiddenFill xmlns:a14="http://schemas.microsoft.com/office/drawing/2010/main">
+              <a14:hiddenFill xmlns:a14="http://schemas.microsoft.com/office/drawing/2010/main" xmlns="">
                 <a:solidFill>
                   <a:srgbClr val="FFFFFF"/>
                 </a:solidFill>
@@ -8635,10 +8904,10 @@
           <p:nvPr/>
         </p:nvPicPr>
         <p:blipFill>
-          <a:blip r:embed="rId4">
+          <a:blip r:embed="rId4" cstate="print">
             <a:extLst>
               <a:ext uri="{28A0092B-C50C-407E-A947-70E740481C1C}">
-                <a14:useLocalDpi xmlns:a14="http://schemas.microsoft.com/office/drawing/2010/main" val="0"/>
+                <a14:useLocalDpi xmlns:a14="http://schemas.microsoft.com/office/drawing/2010/main" xmlns="" val="0"/>
               </a:ext>
             </a:extLst>
           </a:blip>
@@ -8658,7 +8927,7 @@
           <a:noFill/>
           <a:extLst>
             <a:ext uri="{909E8E84-426E-40DD-AFC4-6F175D3DCCD1}">
-              <a14:hiddenFill xmlns:a14="http://schemas.microsoft.com/office/drawing/2010/main">
+              <a14:hiddenFill xmlns:a14="http://schemas.microsoft.com/office/drawing/2010/main" xmlns="">
                 <a:solidFill>
                   <a:srgbClr val="FFFFFF"/>
                 </a:solidFill>
@@ -8670,7 +8939,7 @@
     </p:spTree>
     <p:extLst>
       <p:ext uri="{BB962C8B-B14F-4D97-AF65-F5344CB8AC3E}">
-        <p14:creationId xmlns:p14="http://schemas.microsoft.com/office/powerpoint/2010/main" val="1123622256"/>
+        <p14:creationId xmlns:p14="http://schemas.microsoft.com/office/powerpoint/2010/main" xmlns="" val="1123622256"/>
       </p:ext>
     </p:extLst>
   </p:cSld>
@@ -8821,10 +9090,10 @@
           <p:nvPr/>
         </p:nvPicPr>
         <p:blipFill>
-          <a:blip r:embed="rId3">
+          <a:blip r:embed="rId3" cstate="print">
             <a:extLst>
               <a:ext uri="{28A0092B-C50C-407E-A947-70E740481C1C}">
-                <a14:useLocalDpi xmlns:a14="http://schemas.microsoft.com/office/drawing/2010/main" val="0"/>
+                <a14:useLocalDpi xmlns:a14="http://schemas.microsoft.com/office/drawing/2010/main" xmlns="" val="0"/>
               </a:ext>
             </a:extLst>
           </a:blip>
@@ -8844,7 +9113,7 @@
           <a:noFill/>
           <a:extLst>
             <a:ext uri="{909E8E84-426E-40DD-AFC4-6F175D3DCCD1}">
-              <a14:hiddenFill xmlns:a14="http://schemas.microsoft.com/office/drawing/2010/main">
+              <a14:hiddenFill xmlns:a14="http://schemas.microsoft.com/office/drawing/2010/main" xmlns="">
                 <a:solidFill>
                   <a:srgbClr val="FFFFFF"/>
                 </a:solidFill>
@@ -8862,10 +9131,10 @@
           <p:nvPr/>
         </p:nvPicPr>
         <p:blipFill>
-          <a:blip r:embed="rId4">
+          <a:blip r:embed="rId4" cstate="print">
             <a:extLst>
               <a:ext uri="{28A0092B-C50C-407E-A947-70E740481C1C}">
-                <a14:useLocalDpi xmlns:a14="http://schemas.microsoft.com/office/drawing/2010/main" val="0"/>
+                <a14:useLocalDpi xmlns:a14="http://schemas.microsoft.com/office/drawing/2010/main" xmlns="" val="0"/>
               </a:ext>
             </a:extLst>
           </a:blip>
@@ -8885,7 +9154,7 @@
           <a:noFill/>
           <a:extLst>
             <a:ext uri="{909E8E84-426E-40DD-AFC4-6F175D3DCCD1}">
-              <a14:hiddenFill xmlns:a14="http://schemas.microsoft.com/office/drawing/2010/main">
+              <a14:hiddenFill xmlns:a14="http://schemas.microsoft.com/office/drawing/2010/main" xmlns="">
                 <a:solidFill>
                   <a:srgbClr val="FFFFFF"/>
                 </a:solidFill>
@@ -8897,7 +9166,7 @@
     </p:spTree>
     <p:extLst>
       <p:ext uri="{BB962C8B-B14F-4D97-AF65-F5344CB8AC3E}">
-        <p14:creationId xmlns:p14="http://schemas.microsoft.com/office/powerpoint/2010/main" val="1870868906"/>
+        <p14:creationId xmlns:p14="http://schemas.microsoft.com/office/powerpoint/2010/main" xmlns="" val="1870868906"/>
       </p:ext>
     </p:extLst>
   </p:cSld>
@@ -9056,10 +9325,10 @@
           <p:nvPr/>
         </p:nvPicPr>
         <p:blipFill>
-          <a:blip r:embed="rId3">
+          <a:blip r:embed="rId3" cstate="print">
             <a:extLst>
               <a:ext uri="{28A0092B-C50C-407E-A947-70E740481C1C}">
-                <a14:useLocalDpi xmlns:a14="http://schemas.microsoft.com/office/drawing/2010/main" val="0"/>
+                <a14:useLocalDpi xmlns:a14="http://schemas.microsoft.com/office/drawing/2010/main" xmlns="" val="0"/>
               </a:ext>
             </a:extLst>
           </a:blip>
@@ -9079,7 +9348,7 @@
           <a:noFill/>
           <a:extLst>
             <a:ext uri="{909E8E84-426E-40DD-AFC4-6F175D3DCCD1}">
-              <a14:hiddenFill xmlns:a14="http://schemas.microsoft.com/office/drawing/2010/main">
+              <a14:hiddenFill xmlns:a14="http://schemas.microsoft.com/office/drawing/2010/main" xmlns="">
                 <a:solidFill>
                   <a:srgbClr val="FFFFFF"/>
                 </a:solidFill>
@@ -9097,10 +9366,10 @@
           <p:nvPr/>
         </p:nvPicPr>
         <p:blipFill>
-          <a:blip r:embed="rId4">
+          <a:blip r:embed="rId4" cstate="print">
             <a:extLst>
               <a:ext uri="{28A0092B-C50C-407E-A947-70E740481C1C}">
-                <a14:useLocalDpi xmlns:a14="http://schemas.microsoft.com/office/drawing/2010/main" val="0"/>
+                <a14:useLocalDpi xmlns:a14="http://schemas.microsoft.com/office/drawing/2010/main" xmlns="" val="0"/>
               </a:ext>
             </a:extLst>
           </a:blip>
@@ -9120,7 +9389,7 @@
           <a:noFill/>
           <a:extLst>
             <a:ext uri="{909E8E84-426E-40DD-AFC4-6F175D3DCCD1}">
-              <a14:hiddenFill xmlns:a14="http://schemas.microsoft.com/office/drawing/2010/main">
+              <a14:hiddenFill xmlns:a14="http://schemas.microsoft.com/office/drawing/2010/main" xmlns="">
                 <a:solidFill>
                   <a:srgbClr val="FFFFFF"/>
                 </a:solidFill>
@@ -9132,7 +9401,7 @@
     </p:spTree>
     <p:extLst>
       <p:ext uri="{BB962C8B-B14F-4D97-AF65-F5344CB8AC3E}">
-        <p14:creationId xmlns:p14="http://schemas.microsoft.com/office/powerpoint/2010/main" val="1721468327"/>
+        <p14:creationId xmlns:p14="http://schemas.microsoft.com/office/powerpoint/2010/main" xmlns="" val="1721468327"/>
       </p:ext>
     </p:extLst>
   </p:cSld>
@@ -9314,10 +9583,10 @@
           <p:nvPr/>
         </p:nvPicPr>
         <p:blipFill>
-          <a:blip r:embed="rId3">
+          <a:blip r:embed="rId3" cstate="print">
             <a:extLst>
               <a:ext uri="{28A0092B-C50C-407E-A947-70E740481C1C}">
-                <a14:useLocalDpi xmlns:a14="http://schemas.microsoft.com/office/drawing/2010/main" val="0"/>
+                <a14:useLocalDpi xmlns:a14="http://schemas.microsoft.com/office/drawing/2010/main" xmlns="" val="0"/>
               </a:ext>
             </a:extLst>
           </a:blip>
@@ -9337,7 +9606,7 @@
           <a:noFill/>
           <a:extLst>
             <a:ext uri="{909E8E84-426E-40DD-AFC4-6F175D3DCCD1}">
-              <a14:hiddenFill xmlns:a14="http://schemas.microsoft.com/office/drawing/2010/main">
+              <a14:hiddenFill xmlns:a14="http://schemas.microsoft.com/office/drawing/2010/main" xmlns="">
                 <a:solidFill>
                   <a:srgbClr val="FFFFFF"/>
                 </a:solidFill>
@@ -9355,10 +9624,10 @@
           <p:nvPr/>
         </p:nvPicPr>
         <p:blipFill>
-          <a:blip r:embed="rId4">
+          <a:blip r:embed="rId4" cstate="print">
             <a:extLst>
               <a:ext uri="{28A0092B-C50C-407E-A947-70E740481C1C}">
-                <a14:useLocalDpi xmlns:a14="http://schemas.microsoft.com/office/drawing/2010/main" val="0"/>
+                <a14:useLocalDpi xmlns:a14="http://schemas.microsoft.com/office/drawing/2010/main" xmlns="" val="0"/>
               </a:ext>
             </a:extLst>
           </a:blip>
@@ -9378,7 +9647,7 @@
           <a:noFill/>
           <a:extLst>
             <a:ext uri="{909E8E84-426E-40DD-AFC4-6F175D3DCCD1}">
-              <a14:hiddenFill xmlns:a14="http://schemas.microsoft.com/office/drawing/2010/main">
+              <a14:hiddenFill xmlns:a14="http://schemas.microsoft.com/office/drawing/2010/main" xmlns="">
                 <a:solidFill>
                   <a:srgbClr val="FFFFFF"/>
                 </a:solidFill>
@@ -9396,10 +9665,10 @@
           <p:nvPr/>
         </p:nvPicPr>
         <p:blipFill>
-          <a:blip r:embed="rId5">
+          <a:blip r:embed="rId5" cstate="print">
             <a:extLst>
               <a:ext uri="{28A0092B-C50C-407E-A947-70E740481C1C}">
-                <a14:useLocalDpi xmlns:a14="http://schemas.microsoft.com/office/drawing/2010/main" val="0"/>
+                <a14:useLocalDpi xmlns:a14="http://schemas.microsoft.com/office/drawing/2010/main" xmlns="" val="0"/>
               </a:ext>
             </a:extLst>
           </a:blip>
@@ -9419,7 +9688,7 @@
           <a:noFill/>
           <a:extLst>
             <a:ext uri="{909E8E84-426E-40DD-AFC4-6F175D3DCCD1}">
-              <a14:hiddenFill xmlns:a14="http://schemas.microsoft.com/office/drawing/2010/main">
+              <a14:hiddenFill xmlns:a14="http://schemas.microsoft.com/office/drawing/2010/main" xmlns="">
                 <a:solidFill>
                   <a:srgbClr val="FFFFFF"/>
                 </a:solidFill>
@@ -9437,10 +9706,10 @@
           <p:nvPr/>
         </p:nvPicPr>
         <p:blipFill>
-          <a:blip r:embed="rId6">
+          <a:blip r:embed="rId6" cstate="print">
             <a:extLst>
               <a:ext uri="{28A0092B-C50C-407E-A947-70E740481C1C}">
-                <a14:useLocalDpi xmlns:a14="http://schemas.microsoft.com/office/drawing/2010/main" val="0"/>
+                <a14:useLocalDpi xmlns:a14="http://schemas.microsoft.com/office/drawing/2010/main" xmlns="" val="0"/>
               </a:ext>
             </a:extLst>
           </a:blip>
@@ -9460,7 +9729,7 @@
           <a:noFill/>
           <a:extLst>
             <a:ext uri="{909E8E84-426E-40DD-AFC4-6F175D3DCCD1}">
-              <a14:hiddenFill xmlns:a14="http://schemas.microsoft.com/office/drawing/2010/main">
+              <a14:hiddenFill xmlns:a14="http://schemas.microsoft.com/office/drawing/2010/main" xmlns="">
                 <a:solidFill>
                   <a:srgbClr val="FFFFFF"/>
                 </a:solidFill>
@@ -9508,7 +9777,7 @@
     </p:spTree>
     <p:extLst>
       <p:ext uri="{BB962C8B-B14F-4D97-AF65-F5344CB8AC3E}">
-        <p14:creationId xmlns:p14="http://schemas.microsoft.com/office/powerpoint/2010/main" val="160584204"/>
+        <p14:creationId xmlns:p14="http://schemas.microsoft.com/office/powerpoint/2010/main" xmlns="" val="160584204"/>
       </p:ext>
     </p:extLst>
   </p:cSld>
@@ -9825,14 +10094,14 @@
           <a:effectLst/>
           <a:extLst>
             <a:ext uri="{909E8E84-426E-40DD-AFC4-6F175D3DCCD1}">
-              <a14:hiddenFill xmlns:a14="http://schemas.microsoft.com/office/drawing/2010/main">
+              <a14:hiddenFill xmlns:a14="http://schemas.microsoft.com/office/drawing/2010/main" xmlns="">
                 <a:solidFill>
                   <a:schemeClr val="accent1"/>
                 </a:solidFill>
               </a14:hiddenFill>
             </a:ext>
             <a:ext uri="{91240B29-F687-4F45-9708-019B960494DF}">
-              <a14:hiddenLine xmlns:a14="http://schemas.microsoft.com/office/drawing/2010/main" w="9525">
+              <a14:hiddenLine xmlns:a14="http://schemas.microsoft.com/office/drawing/2010/main" xmlns="" w="9525">
                 <a:solidFill>
                   <a:schemeClr val="tx1"/>
                 </a:solidFill>
@@ -9842,7 +10111,7 @@
               </a14:hiddenLine>
             </a:ext>
             <a:ext uri="{AF507438-7753-43E0-B8FC-AC1667EBCBE1}">
-              <a14:hiddenEffects xmlns:a14="http://schemas.microsoft.com/office/drawing/2010/main">
+              <a14:hiddenEffects xmlns:a14="http://schemas.microsoft.com/office/drawing/2010/main" xmlns="">
                 <a:effectLst>
                   <a:outerShdw dist="35921" dir="2700000" algn="ctr" rotWithShape="0">
                     <a:schemeClr val="bg2"/>
@@ -9874,7 +10143,7 @@
           <p:nvPr>
             <p:extLst>
               <p:ext uri="{D42A27DB-BD31-4B8C-83A1-F6EECF244321}">
-                <p14:modId xmlns:p14="http://schemas.microsoft.com/office/powerpoint/2010/main" val="2103674022"/>
+                <p14:modId xmlns:p14="http://schemas.microsoft.com/office/powerpoint/2010/main" xmlns="" val="2103674022"/>
               </p:ext>
             </p:extLst>
           </p:nvPr>
@@ -9885,58 +10154,16 @@
         </p:xfrm>
         <a:graphic>
           <a:graphicData uri="http://schemas.openxmlformats.org/presentationml/2006/ole">
-            <mc:AlternateContent xmlns:mc="http://schemas.openxmlformats.org/markup-compatibility/2006">
-              <mc:Choice xmlns:v="urn:schemas-microsoft-com:vml" Requires="v">
-                <p:oleObj spid="_x0000_s2157" r:id="rId4" imgW="4320895" imgH="3920947" progId="Visio.Drawing.11">
-                  <p:embed/>
-                </p:oleObj>
-              </mc:Choice>
-              <mc:Fallback>
-                <p:oleObj r:id="rId4" imgW="4320895" imgH="3920947" progId="Visio.Drawing.11">
-                  <p:embed/>
-                  <p:pic>
-                    <p:nvPicPr>
-                      <p:cNvPr id="0" name="Object 1"/>
-                      <p:cNvPicPr>
-                        <a:picLocks noChangeAspect="1" noChangeArrowheads="1"/>
-                      </p:cNvPicPr>
-                      <p:nvPr/>
-                    </p:nvPicPr>
-                    <p:blipFill>
-                      <a:blip r:embed="rId5">
-                        <a:extLst>
-                          <a:ext uri="{28A0092B-C50C-407E-A947-70E740481C1C}">
-                            <a14:useLocalDpi xmlns:a14="http://schemas.microsoft.com/office/drawing/2010/main" val="0"/>
-                          </a:ext>
-                        </a:extLst>
-                      </a:blip>
-                      <a:srcRect/>
-                      <a:stretch>
-                        <a:fillRect/>
-                      </a:stretch>
-                    </p:blipFill>
-                    <p:spPr bwMode="auto">
-                      <a:xfrm>
-                        <a:off x="2257425" y="1711891"/>
-                        <a:ext cx="7905750" cy="7174381"/>
-                      </a:xfrm>
-                      <a:prstGeom prst="rect">
-                        <a:avLst/>
-                      </a:prstGeom>
-                      <a:noFill/>
-                      <a:extLst/>
-                    </p:spPr>
-                  </p:pic>
-                </p:oleObj>
-              </mc:Fallback>
-            </mc:AlternateContent>
+            <p:oleObj spid="_x0000_s2157" r:id="rId4" imgW="4320895" imgH="3920947" progId="Visio.Drawing.11">
+              <p:embed/>
+            </p:oleObj>
           </a:graphicData>
         </a:graphic>
       </p:graphicFrame>
     </p:spTree>
     <p:extLst>
       <p:ext uri="{BB962C8B-B14F-4D97-AF65-F5344CB8AC3E}">
-        <p14:creationId xmlns:p14="http://schemas.microsoft.com/office/powerpoint/2010/main" val="1011665026"/>
+        <p14:creationId xmlns:p14="http://schemas.microsoft.com/office/powerpoint/2010/main" xmlns="" val="1011665026"/>
       </p:ext>
     </p:extLst>
   </p:cSld>
@@ -12949,7 +13176,7 @@
     </p:spTree>
     <p:extLst>
       <p:ext uri="{BB962C8B-B14F-4D97-AF65-F5344CB8AC3E}">
-        <p14:creationId xmlns:p14="http://schemas.microsoft.com/office/powerpoint/2010/main" val="2693572479"/>
+        <p14:creationId xmlns:p14="http://schemas.microsoft.com/office/powerpoint/2010/main" xmlns="" val="2693572479"/>
       </p:ext>
     </p:extLst>
   </p:cSld>
@@ -13166,10 +13393,10 @@
           <p:nvPr/>
         </p:nvPicPr>
         <p:blipFill>
-          <a:blip r:embed="rId3">
+          <a:blip r:embed="rId3" cstate="print">
             <a:extLst>
               <a:ext uri="{28A0092B-C50C-407E-A947-70E740481C1C}">
-                <a14:useLocalDpi xmlns:a14="http://schemas.microsoft.com/office/drawing/2010/main" val="0"/>
+                <a14:useLocalDpi xmlns:a14="http://schemas.microsoft.com/office/drawing/2010/main" xmlns="" val="0"/>
               </a:ext>
             </a:extLst>
           </a:blip>
@@ -13195,7 +13422,7 @@
     </p:spTree>
     <p:extLst>
       <p:ext uri="{BB962C8B-B14F-4D97-AF65-F5344CB8AC3E}">
-        <p14:creationId xmlns:p14="http://schemas.microsoft.com/office/powerpoint/2010/main" val="4085259175"/>
+        <p14:creationId xmlns:p14="http://schemas.microsoft.com/office/powerpoint/2010/main" xmlns="" val="4085259175"/>
       </p:ext>
     </p:extLst>
   </p:cSld>
@@ -14980,6 +15207,28 @@
 </file>
 
 <file path=customXml/item1.xml><?xml version="1.0" encoding="utf-8"?>
+<?mso-contentType ?>
+<FormTemplates xmlns="http://schemas.microsoft.com/sharepoint/v3/contenttype/forms">
+  <Display>DocumentLibraryForm</Display>
+  <Edit>DocumentLibraryForm</Edit>
+  <New>DocumentLibraryForm</New>
+</FormTemplates>
+</file>
+
+<file path=customXml/item2.xml><?xml version="1.0" encoding="utf-8"?>
+<p:properties xmlns:p="http://schemas.microsoft.com/office/2006/metadata/properties" xmlns:xsi="http://www.w3.org/2001/XMLSchema-instance">
+  <documentManagement>
+    <Functional_x0020_Area xmlns="ee014d33-f205-4a05-bc9b-54428b70ff87">3</Functional_x0020_Area>
+    <Subfeature xmlns="ee014d33-f205-4a05-bc9b-54428b70ff87">1</Subfeature>
+    <Doc_x0020_Status xmlns="ee014d33-f205-4a05-bc9b-54428b70ff87">Final</Doc_x0020_Status>
+    <Feature xmlns="ee014d33-f205-4a05-bc9b-54428b70ff87">21</Feature>
+    <Project xmlns="ee014d33-f205-4a05-bc9b-54428b70ff87">8</Project>
+    <Doc_x0020_Type xmlns="ee014d33-f205-4a05-bc9b-54428b70ff87">17</Doc_x0020_Type>
+  </documentManagement>
+</p:properties>
+</file>
+
+<file path=customXml/item3.xml><?xml version="1.0" encoding="utf-8"?>
 <ct:contentTypeSchema xmlns:ct="http://schemas.microsoft.com/office/2006/metadata/contentType" xmlns:ma="http://schemas.microsoft.com/office/2006/metadata/properties/metaAttributes" ct:_="" ma:_="" ma:contentTypeName="Document" ma:contentTypeID="0x01010023A99429DCF3D040AD18CBF19F0FB0E3" ma:contentTypeVersion="11" ma:contentTypeDescription="Create a new document." ma:contentTypeScope="" ma:versionID="f27c50add4ccf62f87061816e27a5dce">
   <xsd:schema xmlns:xsd="http://www.w3.org/2001/XMLSchema" xmlns:p="http://schemas.microsoft.com/office/2006/metadata/properties" xmlns:ns2="ee014d33-f205-4a05-bc9b-54428b70ff87" targetNamespace="http://schemas.microsoft.com/office/2006/metadata/properties" ma:root="true" ma:fieldsID="29f84b02b4e19e4da3ecd85774bade0d" ns2:_="">
     <xsd:import namespace="ee014d33-f205-4a05-bc9b-54428b70ff87"/>
@@ -15074,41 +15323,10 @@
 </ct:contentTypeSchema>
 </file>
 
-<file path=customXml/item2.xml><?xml version="1.0" encoding="utf-8"?>
-<p:properties xmlns:p="http://schemas.microsoft.com/office/2006/metadata/properties" xmlns:xsi="http://www.w3.org/2001/XMLSchema-instance">
-  <documentManagement>
-    <Functional_x0020_Area xmlns="ee014d33-f205-4a05-bc9b-54428b70ff87">3</Functional_x0020_Area>
-    <Subfeature xmlns="ee014d33-f205-4a05-bc9b-54428b70ff87">1</Subfeature>
-    <Doc_x0020_Status xmlns="ee014d33-f205-4a05-bc9b-54428b70ff87">Final</Doc_x0020_Status>
-    <Feature xmlns="ee014d33-f205-4a05-bc9b-54428b70ff87">21</Feature>
-    <Project xmlns="ee014d33-f205-4a05-bc9b-54428b70ff87">8</Project>
-    <Doc_x0020_Type xmlns="ee014d33-f205-4a05-bc9b-54428b70ff87">17</Doc_x0020_Type>
-  </documentManagement>
-</p:properties>
-</file>
-
-<file path=customXml/item3.xml><?xml version="1.0" encoding="utf-8"?>
-<?mso-contentType ?>
-<FormTemplates xmlns="http://schemas.microsoft.com/sharepoint/v3/contenttype/forms">
-  <Display>DocumentLibraryForm</Display>
-  <Edit>DocumentLibraryForm</Edit>
-  <New>DocumentLibraryForm</New>
-</FormTemplates>
-</file>
-
 <file path=customXml/itemProps1.xml><?xml version="1.0" encoding="utf-8"?>
-<ds:datastoreItem xmlns:ds="http://schemas.openxmlformats.org/officeDocument/2006/customXml" ds:itemID="{F602DA55-3A6D-450F-A4C8-AA195AABEC3C}">
+<ds:datastoreItem xmlns:ds="http://schemas.openxmlformats.org/officeDocument/2006/customXml" ds:itemID="{242C6963-0519-424B-98C3-89F870EB2222}">
   <ds:schemaRefs>
-    <ds:schemaRef ds:uri="http://schemas.microsoft.com/office/2006/metadata/contentType"/>
-    <ds:schemaRef ds:uri="http://schemas.microsoft.com/office/2006/metadata/properties/metaAttributes"/>
-    <ds:schemaRef ds:uri="http://www.w3.org/2001/XMLSchema"/>
-    <ds:schemaRef ds:uri="http://schemas.microsoft.com/office/2006/metadata/properties"/>
-    <ds:schemaRef ds:uri="ee014d33-f205-4a05-bc9b-54428b70ff87"/>
-    <ds:schemaRef ds:uri="http://schemas.microsoft.com/office/2006/documentManagement/types"/>
-    <ds:schemaRef ds:uri="http://schemas.openxmlformats.org/package/2006/metadata/core-properties"/>
-    <ds:schemaRef ds:uri="http://purl.org/dc/elements/1.1/"/>
-    <ds:schemaRef ds:uri="http://purl.org/dc/terms/"/>
-    <ds:schemaRef ds:uri="http://schemas.microsoft.com/office/internal/2005/internalDocumentation"/>
+    <ds:schemaRef ds:uri="http://schemas.microsoft.com/sharepoint/v3/contenttype/forms"/>
   </ds:schemaRefs>
 </ds:datastoreItem>
 </file>
@@ -15129,9 +15347,18 @@
 </file>
 
 <file path=customXml/itemProps3.xml><?xml version="1.0" encoding="utf-8"?>
-<ds:datastoreItem xmlns:ds="http://schemas.openxmlformats.org/officeDocument/2006/customXml" ds:itemID="{242C6963-0519-424B-98C3-89F870EB2222}">
+<ds:datastoreItem xmlns:ds="http://schemas.openxmlformats.org/officeDocument/2006/customXml" ds:itemID="{F602DA55-3A6D-450F-A4C8-AA195AABEC3C}">
   <ds:schemaRefs>
-    <ds:schemaRef ds:uri="http://schemas.microsoft.com/sharepoint/v3/contenttype/forms"/>
+    <ds:schemaRef ds:uri="http://schemas.microsoft.com/office/2006/metadata/contentType"/>
+    <ds:schemaRef ds:uri="http://schemas.microsoft.com/office/2006/metadata/properties/metaAttributes"/>
+    <ds:schemaRef ds:uri="http://www.w3.org/2001/XMLSchema"/>
+    <ds:schemaRef ds:uri="http://schemas.microsoft.com/office/2006/metadata/properties"/>
+    <ds:schemaRef ds:uri="ee014d33-f205-4a05-bc9b-54428b70ff87"/>
+    <ds:schemaRef ds:uri="http://schemas.microsoft.com/office/2006/documentManagement/types"/>
+    <ds:schemaRef ds:uri="http://schemas.openxmlformats.org/package/2006/metadata/core-properties"/>
+    <ds:schemaRef ds:uri="http://purl.org/dc/elements/1.1/"/>
+    <ds:schemaRef ds:uri="http://purl.org/dc/terms/"/>
+    <ds:schemaRef ds:uri="http://schemas.microsoft.com/office/internal/2005/internalDocumentation"/>
   </ds:schemaRefs>
 </ds:datastoreItem>
 </file>
</xml_diff>